<commit_message>
Almost end of 17-5-16
</commit_message>
<xml_diff>
--- a/LiteratureReview_talk/lit_review_talk.pptx
+++ b/LiteratureReview_talk/lit_review_talk.pptx
@@ -5,28 +5,27 @@
     <p:sldMasterId id="2147483765" r:id="rId1"/>
   </p:sldMasterIdLst>
   <p:notesMasterIdLst>
-    <p:notesMasterId r:id="rId18"/>
+    <p:notesMasterId r:id="rId17"/>
   </p:notesMasterIdLst>
   <p:handoutMasterIdLst>
-    <p:handoutMasterId r:id="rId19"/>
+    <p:handoutMasterId r:id="rId18"/>
   </p:handoutMasterIdLst>
   <p:sldIdLst>
     <p:sldId id="256" r:id="rId2"/>
     <p:sldId id="257" r:id="rId3"/>
     <p:sldId id="258" r:id="rId4"/>
     <p:sldId id="260" r:id="rId5"/>
-    <p:sldId id="259" r:id="rId6"/>
-    <p:sldId id="265" r:id="rId7"/>
-    <p:sldId id="261" r:id="rId8"/>
-    <p:sldId id="262" r:id="rId9"/>
-    <p:sldId id="263" r:id="rId10"/>
+    <p:sldId id="265" r:id="rId6"/>
+    <p:sldId id="261" r:id="rId7"/>
+    <p:sldId id="262" r:id="rId8"/>
+    <p:sldId id="263" r:id="rId9"/>
+    <p:sldId id="273" r:id="rId10"/>
     <p:sldId id="271" r:id="rId11"/>
-    <p:sldId id="272" r:id="rId12"/>
-    <p:sldId id="266" r:id="rId13"/>
-    <p:sldId id="267" r:id="rId14"/>
-    <p:sldId id="269" r:id="rId15"/>
-    <p:sldId id="268" r:id="rId16"/>
-    <p:sldId id="270" r:id="rId17"/>
+    <p:sldId id="266" r:id="rId12"/>
+    <p:sldId id="267" r:id="rId13"/>
+    <p:sldId id="269" r:id="rId14"/>
+    <p:sldId id="268" r:id="rId15"/>
+    <p:sldId id="270" r:id="rId16"/>
   </p:sldIdLst>
   <p:sldSz cx="9144000" cy="6858000" type="screen4x3"/>
   <p:notesSz cx="6858000" cy="9144000"/>
@@ -816,138 +815,6 @@
           <a:bodyPr/>
           <a:lstStyle/>
           <a:p>
-            <a:r>
-              <a:rPr lang="en-US" sz="1200" kern="1200" dirty="0" smtClean="0">
-                <a:solidFill>
-                  <a:schemeClr val="tx1"/>
-                </a:solidFill>
-                <a:latin typeface="+mn-lt"/>
-                <a:ea typeface="+mn-ea"/>
-                <a:cs typeface="+mn-cs"/>
-              </a:rPr>
-              <a:t>Belle 	– cross section of production of </a:t>
-            </a:r>
-            <a:r>
-              <a:rPr lang="en-US" sz="1200" kern="1200" dirty="0" err="1" smtClean="0">
-                <a:solidFill>
-                  <a:schemeClr val="tx1"/>
-                </a:solidFill>
-                <a:latin typeface="+mn-lt"/>
-                <a:ea typeface="+mn-ea"/>
-                <a:cs typeface="+mn-cs"/>
-              </a:rPr>
-              <a:t>taus</a:t>
-            </a:r>
-            <a:endParaRPr lang="en-US" sz="1200" kern="1200" dirty="0" smtClean="0">
-              <a:solidFill>
-                <a:schemeClr val="tx1"/>
-              </a:solidFill>
-              <a:latin typeface="+mn-lt"/>
-              <a:ea typeface="+mn-ea"/>
-              <a:cs typeface="+mn-cs"/>
-            </a:endParaRPr>
-          </a:p>
-          <a:p>
-            <a:r>
-              <a:rPr lang="en-US" sz="1200" kern="1200" dirty="0" smtClean="0">
-                <a:solidFill>
-                  <a:schemeClr val="tx1"/>
-                </a:solidFill>
-                <a:latin typeface="+mn-lt"/>
-                <a:ea typeface="+mn-ea"/>
-                <a:cs typeface="+mn-cs"/>
-              </a:rPr>
-              <a:t>	- number of </a:t>
-            </a:r>
-            <a:r>
-              <a:rPr lang="en-US" sz="1200" kern="1200" dirty="0" err="1" smtClean="0">
-                <a:solidFill>
-                  <a:schemeClr val="tx1"/>
-                </a:solidFill>
-                <a:latin typeface="+mn-lt"/>
-                <a:ea typeface="+mn-ea"/>
-                <a:cs typeface="+mn-cs"/>
-              </a:rPr>
-              <a:t>taus</a:t>
-            </a:r>
-            <a:r>
-              <a:rPr lang="en-US" sz="1200" kern="1200" dirty="0" smtClean="0">
-                <a:solidFill>
-                  <a:schemeClr val="tx1"/>
-                </a:solidFill>
-                <a:latin typeface="+mn-lt"/>
-                <a:ea typeface="+mn-ea"/>
-                <a:cs typeface="+mn-cs"/>
-              </a:rPr>
-              <a:t> produced</a:t>
-            </a:r>
-          </a:p>
-          <a:p>
-            <a:r>
-              <a:rPr lang="en-US" sz="1200" kern="1200" dirty="0" smtClean="0">
-                <a:solidFill>
-                  <a:schemeClr val="tx1"/>
-                </a:solidFill>
-                <a:latin typeface="+mn-lt"/>
-                <a:ea typeface="+mn-ea"/>
-                <a:cs typeface="+mn-cs"/>
-              </a:rPr>
-              <a:t>	- number of background events expected</a:t>
-            </a:r>
-          </a:p>
-          <a:p>
-            <a:r>
-              <a:rPr lang="en-US" sz="1200" kern="1200" dirty="0" smtClean="0">
-                <a:solidFill>
-                  <a:schemeClr val="tx1"/>
-                </a:solidFill>
-                <a:latin typeface="+mn-lt"/>
-                <a:ea typeface="+mn-ea"/>
-                <a:cs typeface="+mn-cs"/>
-              </a:rPr>
-              <a:t>	- include backgrounds (diagrams)</a:t>
-            </a:r>
-          </a:p>
-          <a:p>
-            <a:endParaRPr lang="en-US" sz="1200" kern="1200" dirty="0" smtClean="0">
-              <a:solidFill>
-                <a:schemeClr val="tx1"/>
-              </a:solidFill>
-              <a:latin typeface="+mn-lt"/>
-              <a:ea typeface="+mn-ea"/>
-              <a:cs typeface="+mn-cs"/>
-            </a:endParaRPr>
-          </a:p>
-          <a:p>
-            <a:r>
-              <a:rPr lang="en-US" sz="1200" kern="1200" dirty="0" smtClean="0">
-                <a:solidFill>
-                  <a:schemeClr val="tx1"/>
-                </a:solidFill>
-                <a:latin typeface="+mn-lt"/>
-                <a:ea typeface="+mn-ea"/>
-                <a:cs typeface="+mn-cs"/>
-              </a:rPr>
-              <a:t>Belle II - ~50 billion tau pairs</a:t>
-            </a:r>
-          </a:p>
-          <a:p>
-            <a:r>
-              <a:rPr lang="en-US" sz="1200" kern="1200" dirty="0" smtClean="0">
-                <a:solidFill>
-                  <a:schemeClr val="tx1"/>
-                </a:solidFill>
-                <a:latin typeface="+mn-lt"/>
-                <a:ea typeface="+mn-ea"/>
-                <a:cs typeface="+mn-cs"/>
-              </a:rPr>
-              <a:t>	- </a:t>
-            </a:r>
-          </a:p>
-          <a:p>
-            <a:endParaRPr lang="en-US" dirty="0" smtClean="0"/>
-          </a:p>
-          <a:p>
             <a:endParaRPr lang="en-US" dirty="0"/>
           </a:p>
         </p:txBody>
@@ -978,7 +845,7 @@
     </p:spTree>
     <p:extLst>
       <p:ext uri="{BB962C8B-B14F-4D97-AF65-F5344CB8AC3E}">
-        <p14:creationId xmlns:p14="http://schemas.microsoft.com/office/powerpoint/2010/main" val="2060181754"/>
+        <p14:creationId xmlns:p14="http://schemas.microsoft.com/office/powerpoint/2010/main" val="575470175"/>
       </p:ext>
     </p:extLst>
   </p:cSld>
@@ -1062,7 +929,7 @@
     </p:spTree>
     <p:extLst>
       <p:ext uri="{BB962C8B-B14F-4D97-AF65-F5344CB8AC3E}">
-        <p14:creationId xmlns:p14="http://schemas.microsoft.com/office/powerpoint/2010/main" val="575470175"/>
+        <p14:creationId xmlns:p14="http://schemas.microsoft.com/office/powerpoint/2010/main" val="1950794889"/>
       </p:ext>
     </p:extLst>
   </p:cSld>
@@ -1116,7 +983,69 @@
           <a:bodyPr/>
           <a:lstStyle/>
           <a:p>
-            <a:endParaRPr lang="en-US" dirty="0"/>
+            <a:pPr marL="628650" lvl="1" indent="-171450">
+              <a:buFontTx/>
+              <a:buChar char="-"/>
+            </a:pPr>
+            <a:r>
+              <a:rPr lang="en-US" dirty="0" smtClean="0"/>
+              <a:t>3,500</a:t>
+            </a:r>
+            <a:r>
+              <a:rPr lang="en-US" baseline="0" dirty="0" smtClean="0"/>
+              <a:t> million with beam background, ~1,000 without beam background</a:t>
+            </a:r>
+          </a:p>
+          <a:p>
+            <a:pPr marL="628650" lvl="1" indent="-171450">
+              <a:buFontTx/>
+              <a:buChar char="-"/>
+            </a:pPr>
+            <a:r>
+              <a:rPr lang="en-US" baseline="0" dirty="0" smtClean="0"/>
+              <a:t>generic = </a:t>
+            </a:r>
+            <a:r>
+              <a:rPr lang="en-US" baseline="0" dirty="0" err="1" smtClean="0"/>
+              <a:t>ee</a:t>
+            </a:r>
+            <a:r>
+              <a:rPr lang="en-US" baseline="0" dirty="0" smtClean="0"/>
+              <a:t>-&gt;tau tau, both </a:t>
+            </a:r>
+            <a:r>
+              <a:rPr lang="en-US" baseline="0" dirty="0" err="1" smtClean="0"/>
+              <a:t>taus</a:t>
+            </a:r>
+            <a:r>
+              <a:rPr lang="en-US" baseline="0" dirty="0" smtClean="0"/>
+              <a:t> decay via SM processes (as given in PDG)</a:t>
+            </a:r>
+          </a:p>
+          <a:p>
+            <a:pPr marL="628650" lvl="1" indent="-171450">
+              <a:buFontTx/>
+              <a:buChar char="-"/>
+            </a:pPr>
+            <a:endParaRPr lang="en-US" baseline="0" dirty="0" smtClean="0"/>
+          </a:p>
+          <a:p>
+            <a:pPr marL="628650" lvl="1" indent="-171450">
+              <a:buFontTx/>
+              <a:buChar char="-"/>
+            </a:pPr>
+            <a:r>
+              <a:rPr lang="en-US" baseline="0" dirty="0" smtClean="0"/>
+              <a:t>various backgrounds include </a:t>
+            </a:r>
+            <a:r>
+              <a:rPr lang="en-US" baseline="0" dirty="0" err="1" smtClean="0"/>
+              <a:t>bhabha</a:t>
+            </a:r>
+            <a:r>
+              <a:rPr lang="en-US" baseline="0" dirty="0" smtClean="0"/>
+              <a:t>, continuum suppression</a:t>
+            </a:r>
           </a:p>
         </p:txBody>
       </p:sp>
@@ -1146,7 +1075,7 @@
     </p:spTree>
     <p:extLst>
       <p:ext uri="{BB962C8B-B14F-4D97-AF65-F5344CB8AC3E}">
-        <p14:creationId xmlns:p14="http://schemas.microsoft.com/office/powerpoint/2010/main" val="1950794889"/>
+        <p14:creationId xmlns:p14="http://schemas.microsoft.com/office/powerpoint/2010/main" val="2358960661"/>
       </p:ext>
     </p:extLst>
   </p:cSld>
@@ -1200,14 +1129,6 @@
           <a:bodyPr/>
           <a:lstStyle/>
           <a:p>
-            <a:r>
-              <a:rPr lang="en-US" dirty="0" smtClean="0"/>
-              <a:t>Extra slide:</a:t>
-            </a:r>
-            <a:r>
-              <a:rPr lang="en-US" baseline="0" dirty="0" smtClean="0"/>
-              <a:t> Belle + Belle II (what I’m doing; using basf2 etc.)</a:t>
-            </a:r>
             <a:endParaRPr lang="en-US" dirty="0"/>
           </a:p>
         </p:txBody>
@@ -1238,7 +1159,7 @@
     </p:spTree>
     <p:extLst>
       <p:ext uri="{BB962C8B-B14F-4D97-AF65-F5344CB8AC3E}">
-        <p14:creationId xmlns:p14="http://schemas.microsoft.com/office/powerpoint/2010/main" val="2358960661"/>
+        <p14:creationId xmlns:p14="http://schemas.microsoft.com/office/powerpoint/2010/main" val="1041370438"/>
       </p:ext>
     </p:extLst>
   </p:cSld>
@@ -1314,90 +1235,6 @@
             <a:fld id="{374B9981-6ADE-A84E-BE29-1305C650E66B}" type="slidenum">
               <a:rPr lang="en-US" smtClean="0"/>
               <a:t>15</a:t>
-            </a:fld>
-            <a:endParaRPr lang="en-US" dirty="0"/>
-          </a:p>
-        </p:txBody>
-      </p:sp>
-    </p:spTree>
-    <p:extLst>
-      <p:ext uri="{BB962C8B-B14F-4D97-AF65-F5344CB8AC3E}">
-        <p14:creationId xmlns:p14="http://schemas.microsoft.com/office/powerpoint/2010/main" val="1041370438"/>
-      </p:ext>
-    </p:extLst>
-  </p:cSld>
-  <p:clrMapOvr>
-    <a:masterClrMapping/>
-  </p:clrMapOvr>
-</p:notes>
-</file>
-
-<file path=ppt/notesSlides/notesSlide15.xml><?xml version="1.0" encoding="utf-8"?>
-<p:notes xmlns:a="http://schemas.openxmlformats.org/drawingml/2006/main" xmlns:r="http://schemas.openxmlformats.org/officeDocument/2006/relationships" xmlns:p="http://schemas.openxmlformats.org/presentationml/2006/main">
-  <p:cSld>
-    <p:spTree>
-      <p:nvGrpSpPr>
-        <p:cNvPr id="1" name=""/>
-        <p:cNvGrpSpPr/>
-        <p:nvPr/>
-      </p:nvGrpSpPr>
-      <p:grpSpPr>
-        <a:xfrm>
-          <a:off x="0" y="0"/>
-          <a:ext cx="0" cy="0"/>
-          <a:chOff x="0" y="0"/>
-          <a:chExt cx="0" cy="0"/>
-        </a:xfrm>
-      </p:grpSpPr>
-      <p:sp>
-        <p:nvSpPr>
-          <p:cNvPr id="2" name="Slide Image Placeholder 1"/>
-          <p:cNvSpPr>
-            <a:spLocks noGrp="1" noRot="1" noChangeAspect="1"/>
-          </p:cNvSpPr>
-          <p:nvPr>
-            <p:ph type="sldImg"/>
-          </p:nvPr>
-        </p:nvSpPr>
-        <p:spPr/>
-      </p:sp>
-      <p:sp>
-        <p:nvSpPr>
-          <p:cNvPr id="3" name="Notes Placeholder 2"/>
-          <p:cNvSpPr>
-            <a:spLocks noGrp="1"/>
-          </p:cNvSpPr>
-          <p:nvPr>
-            <p:ph type="body" idx="1"/>
-          </p:nvPr>
-        </p:nvSpPr>
-        <p:spPr/>
-        <p:txBody>
-          <a:bodyPr/>
-          <a:lstStyle/>
-          <a:p>
-            <a:endParaRPr lang="en-US" dirty="0"/>
-          </a:p>
-        </p:txBody>
-      </p:sp>
-      <p:sp>
-        <p:nvSpPr>
-          <p:cNvPr id="4" name="Slide Number Placeholder 3"/>
-          <p:cNvSpPr>
-            <a:spLocks noGrp="1"/>
-          </p:cNvSpPr>
-          <p:nvPr>
-            <p:ph type="sldNum" sz="quarter" idx="10"/>
-          </p:nvPr>
-        </p:nvSpPr>
-        <p:spPr/>
-        <p:txBody>
-          <a:bodyPr/>
-          <a:lstStyle/>
-          <a:p>
-            <a:fld id="{374B9981-6ADE-A84E-BE29-1305C650E66B}" type="slidenum">
-              <a:rPr lang="en-US" smtClean="0"/>
-              <a:t>16</a:t>
             </a:fld>
             <a:endParaRPr lang="en-US" dirty="0"/>
           </a:p>
@@ -1660,11 +1497,19 @@
           <a:p>
             <a:r>
               <a:rPr lang="en-US" dirty="0" smtClean="0"/>
-              <a:t>We don’t need these slide</a:t>
+              <a:t>	</a:t>
+            </a:r>
+            <a:r>
+              <a:rPr lang="en-US" dirty="0" smtClean="0"/>
+              <a:t>	-</a:t>
             </a:r>
             <a:r>
               <a:rPr lang="en-US" baseline="0" dirty="0" smtClean="0"/>
-              <a:t> (it’s an “Introduction”, rather we just go right in)</a:t>
+              <a:t> Deltas (scalars) are Higgs-like; tau could couple to doubly-charged Higgs which could mediate charged LFV</a:t>
+            </a:r>
+            <a:r>
+              <a:rPr lang="en-US" dirty="0" smtClean="0"/>
+              <a:t>	</a:t>
             </a:r>
             <a:endParaRPr lang="en-US" dirty="0"/>
           </a:p>
@@ -1696,7 +1541,7 @@
     </p:spTree>
     <p:extLst>
       <p:ext uri="{BB962C8B-B14F-4D97-AF65-F5344CB8AC3E}">
-        <p14:creationId xmlns:p14="http://schemas.microsoft.com/office/powerpoint/2010/main" val="2198955447"/>
+        <p14:creationId xmlns:p14="http://schemas.microsoft.com/office/powerpoint/2010/main" val="3182979447"/>
       </p:ext>
     </p:extLst>
   </p:cSld>
@@ -1752,13 +1597,7 @@
           <a:p>
             <a:r>
               <a:rPr lang="en-US" dirty="0" smtClean="0"/>
-              <a:t>	- lepton sector not fully understood</a:t>
-            </a:r>
-          </a:p>
-          <a:p>
-            <a:r>
-              <a:rPr lang="en-US" dirty="0" smtClean="0"/>
-              <a:t>	</a:t>
+              <a:t>Put the results up</a:t>
             </a:r>
             <a:endParaRPr lang="en-US" dirty="0"/>
           </a:p>
@@ -1790,7 +1629,7 @@
     </p:spTree>
     <p:extLst>
       <p:ext uri="{BB962C8B-B14F-4D97-AF65-F5344CB8AC3E}">
-        <p14:creationId xmlns:p14="http://schemas.microsoft.com/office/powerpoint/2010/main" val="3182979447"/>
+        <p14:creationId xmlns:p14="http://schemas.microsoft.com/office/powerpoint/2010/main" val="2310754787"/>
       </p:ext>
     </p:extLst>
   </p:cSld>
@@ -1846,7 +1685,17 @@
           <a:p>
             <a:r>
               <a:rPr lang="en-US" dirty="0" smtClean="0"/>
-              <a:t>Put the results up</a:t>
+              <a:t>Use better plot (Emilie’s thing)</a:t>
+            </a:r>
+          </a:p>
+          <a:p>
+            <a:r>
+              <a:rPr lang="en-US" dirty="0" smtClean="0"/>
+              <a:t>Put</a:t>
+            </a:r>
+            <a:r>
+              <a:rPr lang="en-US" baseline="0" dirty="0" smtClean="0"/>
+              <a:t> in ATLAS lines</a:t>
             </a:r>
             <a:endParaRPr lang="en-US" dirty="0"/>
           </a:p>
@@ -1878,7 +1727,7 @@
     </p:spTree>
     <p:extLst>
       <p:ext uri="{BB962C8B-B14F-4D97-AF65-F5344CB8AC3E}">
-        <p14:creationId xmlns:p14="http://schemas.microsoft.com/office/powerpoint/2010/main" val="2310754787"/>
+        <p14:creationId xmlns:p14="http://schemas.microsoft.com/office/powerpoint/2010/main" val="531634787"/>
       </p:ext>
     </p:extLst>
   </p:cSld>
@@ -1934,17 +1783,11 @@
           <a:p>
             <a:r>
               <a:rPr lang="en-US" dirty="0" smtClean="0"/>
-              <a:t>Use better plot (Emilie’s thing)</a:t>
-            </a:r>
-          </a:p>
-          <a:p>
-            <a:r>
-              <a:rPr lang="en-US" dirty="0" smtClean="0"/>
-              <a:t>Put</a:t>
+              <a:t>“Reduce</a:t>
             </a:r>
             <a:r>
               <a:rPr lang="en-US" baseline="0" dirty="0" smtClean="0"/>
-              <a:t> in ATLAS lines</a:t>
+              <a:t> parts of phase space”</a:t>
             </a:r>
             <a:endParaRPr lang="en-US" dirty="0"/>
           </a:p>
@@ -1976,7 +1819,7 @@
     </p:spTree>
     <p:extLst>
       <p:ext uri="{BB962C8B-B14F-4D97-AF65-F5344CB8AC3E}">
-        <p14:creationId xmlns:p14="http://schemas.microsoft.com/office/powerpoint/2010/main" val="531634787"/>
+        <p14:creationId xmlns:p14="http://schemas.microsoft.com/office/powerpoint/2010/main" val="1686348327"/>
       </p:ext>
     </p:extLst>
   </p:cSld>
@@ -2032,11 +1875,19 @@
           <a:p>
             <a:r>
               <a:rPr lang="en-US" dirty="0" smtClean="0"/>
-              <a:t>“Reduce</a:t>
+              <a:t>Note:</a:t>
             </a:r>
             <a:r>
               <a:rPr lang="en-US" baseline="0" dirty="0" smtClean="0"/>
-              <a:t> parts of phase space”</a:t>
+              <a:t> </a:t>
+            </a:r>
+            <a:r>
+              <a:rPr lang="en-US" baseline="0" dirty="0" err="1" smtClean="0"/>
+              <a:t>ee</a:t>
+            </a:r>
+            <a:r>
+              <a:rPr lang="en-US" baseline="0" dirty="0" smtClean="0"/>
+              <a:t>-&gt;tau tau cross section ~0.9nb (0.919nb)</a:t>
             </a:r>
             <a:endParaRPr lang="en-US" dirty="0"/>
           </a:p>
@@ -2068,7 +1919,7 @@
     </p:spTree>
     <p:extLst>
       <p:ext uri="{BB962C8B-B14F-4D97-AF65-F5344CB8AC3E}">
-        <p14:creationId xmlns:p14="http://schemas.microsoft.com/office/powerpoint/2010/main" val="1686348327"/>
+        <p14:creationId xmlns:p14="http://schemas.microsoft.com/office/powerpoint/2010/main" val="2060181754"/>
       </p:ext>
     </p:extLst>
   </p:cSld>
@@ -5573,7 +5424,19 @@
           <a:p>
             <a:r>
               <a:rPr lang="en-US" dirty="0" smtClean="0"/>
-              <a:t>Belle &amp; Belle II</a:t>
+              <a:t>Belle </a:t>
+            </a:r>
+            <a:r>
+              <a:rPr lang="en-US" dirty="0" smtClean="0"/>
+              <a:t>&amp; </a:t>
+            </a:r>
+            <a:r>
+              <a:rPr lang="en-US" dirty="0" smtClean="0"/>
+              <a:t>Belle </a:t>
+            </a:r>
+            <a:r>
+              <a:rPr lang="en-US" dirty="0" smtClean="0"/>
+              <a:t>II</a:t>
             </a:r>
             <a:endParaRPr lang="en-US" dirty="0"/>
           </a:p>
@@ -5589,79 +5452,55 @@
             <p:ph idx="1"/>
           </p:nvPr>
         </p:nvSpPr>
-        <p:spPr/>
-        <p:txBody>
-          <a:bodyPr/>
-          <a:lstStyle/>
-          <a:p>
-            <a:r>
-              <a:rPr lang="en-US" dirty="0" smtClean="0"/>
-              <a:t>Belle ~ 1 billion tau pairs</a:t>
+        <p:spPr>
+          <a:xfrm>
+            <a:off x="457200" y="1600200"/>
+            <a:ext cx="5455920" cy="4800600"/>
+          </a:xfrm>
+        </p:spPr>
+        <p:txBody>
+          <a:bodyPr>
+            <a:normAutofit/>
+          </a:bodyPr>
+          <a:lstStyle/>
+          <a:p>
+            <a:r>
+              <a:rPr lang="en-US" dirty="0" smtClean="0"/>
+              <a:t>Belle </a:t>
+            </a:r>
+            <a:r>
+              <a:rPr lang="en-US" dirty="0" smtClean="0"/>
+              <a:t>– 1000 fb</a:t>
+            </a:r>
+            <a:r>
+              <a:rPr lang="en-US" sz="2000" baseline="30000" dirty="0" smtClean="0"/>
+              <a:t>-1</a:t>
+            </a:r>
+            <a:r>
+              <a:rPr lang="en-US" dirty="0" smtClean="0"/>
+              <a:t> of data (full run data)</a:t>
             </a:r>
           </a:p>
           <a:p>
             <a:pPr lvl="1"/>
             <a:r>
               <a:rPr lang="en-US" dirty="0" smtClean="0"/>
-              <a:t>no. of tau pairs produced</a:t>
-            </a:r>
-          </a:p>
-          <a:p>
-            <a:pPr lvl="1"/>
-            <a:r>
-              <a:rPr lang="en-US" dirty="0" smtClean="0"/>
-              <a:t>no. of background events expected (efficiency)</a:t>
-            </a:r>
-          </a:p>
-          <a:p>
-            <a:pPr lvl="1"/>
-            <a:r>
-              <a:rPr lang="en-US" dirty="0" smtClean="0"/>
-              <a:t>background diagrams?</a:t>
-            </a:r>
-          </a:p>
-          <a:p>
-            <a:pPr marL="411480" lvl="1" indent="0">
-              <a:buNone/>
-            </a:pPr>
-            <a:endParaRPr lang="en-US" dirty="0"/>
-          </a:p>
-          <a:p>
-            <a:r>
-              <a:rPr lang="en-US" dirty="0"/>
-              <a:t>key backgrounds for </a:t>
-            </a:r>
-            <a:r>
-              <a:rPr lang="en-US" dirty="0" err="1"/>
-              <a:t>τ</a:t>
-            </a:r>
-            <a:r>
-              <a:rPr lang="en-US" dirty="0"/>
-              <a:t> </a:t>
-            </a:r>
-            <a:r>
-              <a:rPr lang="en-US" sz="2400" dirty="0">
-                <a:latin typeface="+mj-lt"/>
-              </a:rPr>
-              <a:t>→</a:t>
-            </a:r>
-            <a:r>
-              <a:rPr lang="en-US" sz="1600" dirty="0"/>
-              <a:t> </a:t>
-            </a:r>
-            <a:r>
-              <a:rPr lang="en-US" dirty="0"/>
-              <a:t>μ γ:</a:t>
-            </a:r>
-          </a:p>
-          <a:p>
-            <a:pPr lvl="1"/>
-            <a:r>
-              <a:rPr lang="en-US" dirty="0" err="1"/>
-              <a:t>τ</a:t>
-            </a:r>
-            <a:r>
-              <a:rPr lang="en-US" dirty="0"/>
+              <a:t>e</a:t>
+            </a:r>
+            <a:r>
+              <a:rPr lang="en-US" baseline="30000" dirty="0" smtClean="0"/>
+              <a:t>+</a:t>
+            </a:r>
+            <a:r>
+              <a:rPr lang="en-US" dirty="0" smtClean="0"/>
+              <a:t> e</a:t>
+            </a:r>
+            <a:r>
+              <a:rPr lang="en-US" baseline="30000" dirty="0" smtClean="0"/>
+              <a:t>-</a:t>
+            </a:r>
+            <a:r>
+              <a:rPr lang="en-US" dirty="0" smtClean="0"/>
               <a:t> </a:t>
             </a:r>
             <a:r>
@@ -5674,22 +5513,178 @@
               <a:t>→</a:t>
             </a:r>
             <a:r>
+              <a:rPr lang="en-US" dirty="0">
+                <a:solidFill>
+                  <a:srgbClr val="2F2B20"/>
+                </a:solidFill>
+              </a:rPr>
+              <a:t> </a:t>
+            </a:r>
+            <a:r>
+              <a:rPr lang="en-US" dirty="0" err="1" smtClean="0">
+                <a:solidFill>
+                  <a:prstClr val="black"/>
+                </a:solidFill>
+              </a:rPr>
+              <a:t>τ</a:t>
+            </a:r>
+            <a:r>
+              <a:rPr lang="en-US" baseline="30000" dirty="0" smtClean="0">
+                <a:solidFill>
+                  <a:prstClr val="black"/>
+                </a:solidFill>
+              </a:rPr>
+              <a:t>+</a:t>
+            </a:r>
+            <a:r>
+              <a:rPr lang="en-US" dirty="0" smtClean="0"/>
+              <a:t> </a:t>
+            </a:r>
+            <a:r>
+              <a:rPr lang="en-US" dirty="0" err="1" smtClean="0">
+                <a:solidFill>
+                  <a:prstClr val="black"/>
+                </a:solidFill>
+              </a:rPr>
+              <a:t>τ</a:t>
+            </a:r>
+            <a:r>
+              <a:rPr lang="en-US" baseline="30000" dirty="0" smtClean="0">
+                <a:solidFill>
+                  <a:prstClr val="black"/>
+                </a:solidFill>
+              </a:rPr>
+              <a:t>-</a:t>
+            </a:r>
+            <a:r>
+              <a:rPr lang="en-US" dirty="0" smtClean="0"/>
+              <a:t>	</a:t>
+            </a:r>
+            <a:r>
+              <a:rPr lang="en-US" dirty="0" smtClean="0">
+                <a:latin typeface="+mj-lt"/>
+              </a:rPr>
+              <a:t>~ </a:t>
+            </a:r>
+            <a:r>
+              <a:rPr lang="en-US" dirty="0" smtClean="0"/>
+              <a:t>900 × 10</a:t>
+            </a:r>
+            <a:r>
+              <a:rPr lang="en-US" baseline="30000" dirty="0" smtClean="0"/>
+              <a:t>6</a:t>
+            </a:r>
+            <a:r>
+              <a:rPr lang="en-US" dirty="0" smtClean="0"/>
+              <a:t> tau-pairs</a:t>
+            </a:r>
+          </a:p>
+          <a:p>
+            <a:pPr lvl="1">
+              <a:buClr>
+                <a:srgbClr val="4584D3"/>
+              </a:buClr>
+            </a:pPr>
+            <a:r>
+              <a:rPr lang="en-US" dirty="0" err="1">
+                <a:solidFill>
+                  <a:prstClr val="black"/>
+                </a:solidFill>
+              </a:rPr>
+              <a:t>τ</a:t>
+            </a:r>
+            <a:r>
+              <a:rPr lang="en-US" dirty="0">
+                <a:solidFill>
+                  <a:prstClr val="black"/>
+                </a:solidFill>
+              </a:rPr>
+              <a:t> </a:t>
+            </a:r>
+            <a:r>
+              <a:rPr lang="en-US" dirty="0">
+                <a:solidFill>
+                  <a:srgbClr val="2F2B20"/>
+                </a:solidFill>
+                <a:latin typeface="Cambria"/>
+              </a:rPr>
+              <a:t>→</a:t>
+            </a:r>
+            <a:r>
+              <a:rPr lang="en-US" dirty="0">
+                <a:solidFill>
+                  <a:prstClr val="black"/>
+                </a:solidFill>
+              </a:rPr>
+              <a:t> μ </a:t>
+            </a:r>
+            <a:r>
+              <a:rPr lang="en-US" dirty="0" err="1">
+                <a:solidFill>
+                  <a:prstClr val="black"/>
+                </a:solidFill>
+              </a:rPr>
+              <a:t>ν</a:t>
+            </a:r>
+            <a:r>
+              <a:rPr lang="en-US" dirty="0">
+                <a:solidFill>
+                  <a:prstClr val="black"/>
+                </a:solidFill>
+              </a:rPr>
+              <a:t> </a:t>
+            </a:r>
+            <a:r>
+              <a:rPr lang="en-US" dirty="0" err="1" smtClean="0">
+                <a:solidFill>
+                  <a:prstClr val="black"/>
+                </a:solidFill>
+              </a:rPr>
+              <a:t>ν</a:t>
+            </a:r>
+            <a:r>
+              <a:rPr lang="en-US" dirty="0" smtClean="0">
+                <a:solidFill>
+                  <a:prstClr val="black"/>
+                </a:solidFill>
+              </a:rPr>
+              <a:t>	</a:t>
+            </a:r>
+            <a:r>
+              <a:rPr lang="fr-FR" dirty="0" smtClean="0">
+                <a:latin typeface="+mj-lt"/>
+              </a:rPr>
+              <a:t>~ </a:t>
+            </a:r>
+            <a:r>
+              <a:rPr lang="fr-FR" dirty="0" smtClean="0"/>
+              <a:t>150 </a:t>
+            </a:r>
+            <a:r>
               <a:rPr lang="en-US" dirty="0"/>
-              <a:t> μ </a:t>
-            </a:r>
-            <a:r>
-              <a:rPr lang="en-US" dirty="0" err="1"/>
-              <a:t>ν</a:t>
-            </a:r>
-            <a:r>
-              <a:rPr lang="en-US" dirty="0"/>
-              <a:t> </a:t>
-            </a:r>
-            <a:r>
-              <a:rPr lang="en-US" dirty="0" err="1"/>
-              <a:t>ν</a:t>
-            </a:r>
-            <a:endParaRPr lang="en-US" dirty="0"/>
+              <a:t>× </a:t>
+            </a:r>
+            <a:r>
+              <a:rPr lang="en-US" dirty="0" smtClean="0"/>
+              <a:t>10</a:t>
+            </a:r>
+            <a:r>
+              <a:rPr lang="en-US" baseline="30000" dirty="0" smtClean="0"/>
+              <a:t>6 </a:t>
+            </a:r>
+            <a:r>
+              <a:rPr lang="en-US" dirty="0" smtClean="0">
+                <a:solidFill>
+                  <a:prstClr val="black"/>
+                </a:solidFill>
+              </a:rPr>
+              <a:t>events</a:t>
+            </a:r>
+            <a:endParaRPr lang="en-US" dirty="0">
+              <a:solidFill>
+                <a:prstClr val="black"/>
+              </a:solidFill>
+            </a:endParaRPr>
           </a:p>
           <a:p>
             <a:pPr lvl="1"/>
@@ -5720,14 +5715,191 @@
             </a:r>
             <a:r>
               <a:rPr lang="en-US" dirty="0"/>
-              <a:t> (π misidentified as μ) </a:t>
-            </a:r>
+              <a:t> </a:t>
+            </a:r>
+            <a:r>
+              <a:rPr lang="en-US" dirty="0" smtClean="0"/>
+              <a:t>	</a:t>
+            </a:r>
+            <a:r>
+              <a:rPr lang="fr-FR" dirty="0" smtClean="0">
+                <a:latin typeface="+mj-lt"/>
+              </a:rPr>
+              <a:t>~</a:t>
+            </a:r>
+            <a:r>
+              <a:rPr lang="fr-FR" dirty="0" smtClean="0"/>
+              <a:t> 100 </a:t>
+            </a:r>
+            <a:r>
+              <a:rPr lang="en-US" dirty="0"/>
+              <a:t>× </a:t>
+            </a:r>
+            <a:r>
+              <a:rPr lang="en-US" dirty="0" smtClean="0"/>
+              <a:t>10</a:t>
+            </a:r>
+            <a:r>
+              <a:rPr lang="en-US" baseline="30000" dirty="0" smtClean="0"/>
+              <a:t>6 </a:t>
+            </a:r>
+            <a:r>
+              <a:rPr lang="en-US" dirty="0" smtClean="0">
+                <a:solidFill>
+                  <a:prstClr val="black"/>
+                </a:solidFill>
+              </a:rPr>
+              <a:t>events</a:t>
+            </a:r>
+          </a:p>
+          <a:p>
+            <a:pPr lvl="1">
+              <a:buClr>
+                <a:srgbClr val="4584D3"/>
+              </a:buClr>
+            </a:pPr>
+            <a:r>
+              <a:rPr lang="en-US" dirty="0"/>
+              <a:t>e </a:t>
+            </a:r>
+            <a:r>
+              <a:rPr lang="en-US" dirty="0" smtClean="0"/>
+              <a:t>e </a:t>
+            </a:r>
+            <a:r>
+              <a:rPr lang="en-US" dirty="0">
+                <a:solidFill>
+                  <a:srgbClr val="2F2B20"/>
+                </a:solidFill>
+              </a:rPr>
+              <a:t>→</a:t>
+            </a:r>
+            <a:r>
+              <a:rPr lang="en-US" sz="1600" dirty="0">
+                <a:solidFill>
+                  <a:srgbClr val="2F2B20"/>
+                </a:solidFill>
+              </a:rPr>
+              <a:t> </a:t>
+            </a:r>
+            <a:r>
+              <a:rPr lang="en-US" dirty="0"/>
+              <a:t>μ μ </a:t>
+            </a:r>
+            <a:r>
+              <a:rPr lang="en-US" dirty="0" smtClean="0"/>
+              <a:t>γ</a:t>
+            </a:r>
+            <a:r>
+              <a:rPr lang="en-US" dirty="0">
+                <a:solidFill>
+                  <a:prstClr val="black"/>
+                </a:solidFill>
+              </a:rPr>
+              <a:t>	</a:t>
+            </a:r>
+            <a:r>
+              <a:rPr lang="fr-FR" dirty="0">
+                <a:solidFill>
+                  <a:prstClr val="black"/>
+                </a:solidFill>
+                <a:latin typeface="Cambria"/>
+              </a:rPr>
+              <a:t>~</a:t>
+            </a:r>
+            <a:r>
+              <a:rPr lang="fr-FR" dirty="0">
+                <a:solidFill>
+                  <a:prstClr val="black"/>
+                </a:solidFill>
+              </a:rPr>
+              <a:t> </a:t>
+            </a:r>
+            <a:r>
+              <a:rPr lang="fr-FR" dirty="0" smtClean="0">
+                <a:solidFill>
+                  <a:prstClr val="black"/>
+                </a:solidFill>
+              </a:rPr>
+              <a:t>250 </a:t>
+            </a:r>
+            <a:r>
+              <a:rPr lang="en-US" dirty="0"/>
+              <a:t>× </a:t>
+            </a:r>
+            <a:r>
+              <a:rPr lang="en-US" dirty="0" smtClean="0"/>
+              <a:t>10</a:t>
+            </a:r>
+            <a:r>
+              <a:rPr lang="en-US" baseline="30000" dirty="0" smtClean="0"/>
+              <a:t>6 </a:t>
+            </a:r>
+            <a:r>
+              <a:rPr lang="en-US" dirty="0" smtClean="0">
+                <a:solidFill>
+                  <a:prstClr val="black"/>
+                </a:solidFill>
+              </a:rPr>
+              <a:t>events</a:t>
+            </a:r>
+          </a:p>
+          <a:p>
+            <a:pPr lvl="1">
+              <a:buClr>
+                <a:srgbClr val="4584D3"/>
+              </a:buClr>
+            </a:pPr>
+            <a:endParaRPr lang="en-US" dirty="0">
+              <a:solidFill>
+                <a:prstClr val="black"/>
+              </a:solidFill>
+            </a:endParaRPr>
+          </a:p>
+          <a:p>
+            <a:r>
+              <a:rPr lang="en-US" dirty="0"/>
+              <a:t>Belle II – </a:t>
+            </a:r>
+            <a:r>
+              <a:rPr lang="en-US" dirty="0" smtClean="0"/>
+              <a:t>50 ab</a:t>
+            </a:r>
+            <a:r>
+              <a:rPr lang="en-US" baseline="30000" dirty="0"/>
+              <a:t>-</a:t>
+            </a:r>
+            <a:r>
+              <a:rPr lang="en-US" baseline="30000" dirty="0" smtClean="0"/>
+              <a:t>1</a:t>
+            </a:r>
+            <a:r>
+              <a:rPr lang="en-US" dirty="0" smtClean="0"/>
+              <a:t> (predicted luminosity)</a:t>
+            </a:r>
+            <a:endParaRPr lang="en-US" dirty="0"/>
           </a:p>
           <a:p>
             <a:pPr lvl="1"/>
             <a:r>
               <a:rPr lang="en-US" dirty="0"/>
-              <a:t>e e </a:t>
+              <a:t>e</a:t>
+            </a:r>
+            <a:r>
+              <a:rPr lang="en-US" baseline="30000" dirty="0"/>
+              <a:t>+</a:t>
+            </a:r>
+            <a:r>
+              <a:rPr lang="en-US" dirty="0"/>
+              <a:t> e</a:t>
+            </a:r>
+            <a:r>
+              <a:rPr lang="en-US" baseline="30000" dirty="0"/>
+              <a:t>-</a:t>
+            </a:r>
+            <a:r>
+              <a:rPr lang="en-US" dirty="0"/>
+              <a:t> </a:t>
             </a:r>
             <a:r>
               <a:rPr lang="en-US" dirty="0">
@@ -5739,6 +5911,294 @@
               <a:t>→</a:t>
             </a:r>
             <a:r>
+              <a:rPr lang="en-US" dirty="0">
+                <a:solidFill>
+                  <a:srgbClr val="2F2B20"/>
+                </a:solidFill>
+              </a:rPr>
+              <a:t> </a:t>
+            </a:r>
+            <a:r>
+              <a:rPr lang="en-US" dirty="0" err="1">
+                <a:solidFill>
+                  <a:prstClr val="black"/>
+                </a:solidFill>
+              </a:rPr>
+              <a:t>τ</a:t>
+            </a:r>
+            <a:r>
+              <a:rPr lang="en-US" baseline="30000" dirty="0">
+                <a:solidFill>
+                  <a:prstClr val="black"/>
+                </a:solidFill>
+              </a:rPr>
+              <a:t>+</a:t>
+            </a:r>
+            <a:r>
+              <a:rPr lang="en-US" dirty="0"/>
+              <a:t> </a:t>
+            </a:r>
+            <a:r>
+              <a:rPr lang="en-US" dirty="0" err="1">
+                <a:solidFill>
+                  <a:prstClr val="black"/>
+                </a:solidFill>
+              </a:rPr>
+              <a:t>τ</a:t>
+            </a:r>
+            <a:r>
+              <a:rPr lang="en-US" baseline="30000" dirty="0">
+                <a:solidFill>
+                  <a:prstClr val="black"/>
+                </a:solidFill>
+              </a:rPr>
+              <a:t>-</a:t>
+            </a:r>
+            <a:r>
+              <a:rPr lang="en-US" dirty="0"/>
+              <a:t>	</a:t>
+            </a:r>
+            <a:r>
+              <a:rPr lang="en-US" dirty="0">
+                <a:latin typeface="+mj-lt"/>
+              </a:rPr>
+              <a:t>~</a:t>
+            </a:r>
+            <a:r>
+              <a:rPr lang="en-US" dirty="0"/>
+              <a:t> </a:t>
+            </a:r>
+            <a:r>
+              <a:rPr lang="en-US" dirty="0" smtClean="0"/>
+              <a:t>450 </a:t>
+            </a:r>
+            <a:r>
+              <a:rPr lang="en-US" dirty="0"/>
+              <a:t>× </a:t>
+            </a:r>
+            <a:r>
+              <a:rPr lang="en-US" dirty="0" smtClean="0"/>
+              <a:t>10</a:t>
+            </a:r>
+            <a:r>
+              <a:rPr lang="en-US" baseline="30000" dirty="0" smtClean="0"/>
+              <a:t>8 </a:t>
+            </a:r>
+            <a:r>
+              <a:rPr lang="en-US" dirty="0" smtClean="0"/>
+              <a:t>tau</a:t>
+            </a:r>
+            <a:r>
+              <a:rPr lang="en-US" dirty="0"/>
+              <a:t>-pairs</a:t>
+            </a:r>
+          </a:p>
+          <a:p>
+            <a:pPr lvl="1">
+              <a:buClr>
+                <a:srgbClr val="4584D3"/>
+              </a:buClr>
+            </a:pPr>
+            <a:r>
+              <a:rPr lang="en-US" dirty="0" err="1">
+                <a:solidFill>
+                  <a:prstClr val="black"/>
+                </a:solidFill>
+              </a:rPr>
+              <a:t>τ</a:t>
+            </a:r>
+            <a:r>
+              <a:rPr lang="en-US" dirty="0">
+                <a:solidFill>
+                  <a:prstClr val="black"/>
+                </a:solidFill>
+              </a:rPr>
+              <a:t> </a:t>
+            </a:r>
+            <a:r>
+              <a:rPr lang="en-US" dirty="0">
+                <a:solidFill>
+                  <a:srgbClr val="2F2B20"/>
+                </a:solidFill>
+                <a:latin typeface="+mj-lt"/>
+              </a:rPr>
+              <a:t>→</a:t>
+            </a:r>
+            <a:r>
+              <a:rPr lang="en-US" dirty="0">
+                <a:solidFill>
+                  <a:prstClr val="black"/>
+                </a:solidFill>
+              </a:rPr>
+              <a:t> μ </a:t>
+            </a:r>
+            <a:r>
+              <a:rPr lang="en-US" dirty="0" err="1">
+                <a:solidFill>
+                  <a:prstClr val="black"/>
+                </a:solidFill>
+              </a:rPr>
+              <a:t>ν</a:t>
+            </a:r>
+            <a:r>
+              <a:rPr lang="en-US" dirty="0">
+                <a:solidFill>
+                  <a:prstClr val="black"/>
+                </a:solidFill>
+              </a:rPr>
+              <a:t> </a:t>
+            </a:r>
+            <a:r>
+              <a:rPr lang="en-US" dirty="0" err="1">
+                <a:solidFill>
+                  <a:prstClr val="black"/>
+                </a:solidFill>
+              </a:rPr>
+              <a:t>ν</a:t>
+            </a:r>
+            <a:r>
+              <a:rPr lang="en-US" dirty="0">
+                <a:solidFill>
+                  <a:prstClr val="black"/>
+                </a:solidFill>
+              </a:rPr>
+              <a:t>	</a:t>
+            </a:r>
+            <a:r>
+              <a:rPr lang="fr-FR" dirty="0">
+                <a:latin typeface="+mj-lt"/>
+              </a:rPr>
+              <a:t>~</a:t>
+            </a:r>
+            <a:r>
+              <a:rPr lang="fr-FR" dirty="0"/>
+              <a:t> </a:t>
+            </a:r>
+            <a:r>
+              <a:rPr lang="fr-FR" dirty="0"/>
+              <a:t> </a:t>
+            </a:r>
+            <a:r>
+              <a:rPr lang="fr-FR" dirty="0" smtClean="0"/>
+              <a:t> 75 </a:t>
+            </a:r>
+            <a:r>
+              <a:rPr lang="en-US" dirty="0"/>
+              <a:t>× </a:t>
+            </a:r>
+            <a:r>
+              <a:rPr lang="en-US" dirty="0" smtClean="0"/>
+              <a:t>10</a:t>
+            </a:r>
+            <a:r>
+              <a:rPr lang="en-US" baseline="30000" dirty="0" smtClean="0"/>
+              <a:t>8 </a:t>
+            </a:r>
+            <a:r>
+              <a:rPr lang="en-US" dirty="0" smtClean="0">
+                <a:solidFill>
+                  <a:prstClr val="black"/>
+                </a:solidFill>
+              </a:rPr>
+              <a:t>events</a:t>
+            </a:r>
+            <a:endParaRPr lang="en-US" dirty="0">
+              <a:solidFill>
+                <a:prstClr val="black"/>
+              </a:solidFill>
+            </a:endParaRPr>
+          </a:p>
+          <a:p>
+            <a:pPr lvl="1"/>
+            <a:r>
+              <a:rPr lang="en-US" dirty="0" err="1"/>
+              <a:t>τ</a:t>
+            </a:r>
+            <a:r>
+              <a:rPr lang="en-US" dirty="0"/>
+              <a:t> </a:t>
+            </a:r>
+            <a:r>
+              <a:rPr lang="en-US" dirty="0">
+                <a:solidFill>
+                  <a:srgbClr val="2F2B20"/>
+                </a:solidFill>
+                <a:latin typeface="+mj-lt"/>
+              </a:rPr>
+              <a:t>→</a:t>
+            </a:r>
+            <a:r>
+              <a:rPr lang="en-US" dirty="0"/>
+              <a:t> π </a:t>
+            </a:r>
+            <a:r>
+              <a:rPr lang="en-US" dirty="0" err="1"/>
+              <a:t>ν</a:t>
+            </a:r>
+            <a:r>
+              <a:rPr lang="en-US" dirty="0"/>
+              <a:t> 	</a:t>
+            </a:r>
+            <a:r>
+              <a:rPr lang="fr-FR" dirty="0">
+                <a:latin typeface="+mj-lt"/>
+              </a:rPr>
+              <a:t>~</a:t>
+            </a:r>
+            <a:r>
+              <a:rPr lang="fr-FR" dirty="0"/>
+              <a:t>  </a:t>
+            </a:r>
+            <a:r>
+              <a:rPr lang="fr-FR" dirty="0" smtClean="0"/>
+              <a:t> 50 </a:t>
+            </a:r>
+            <a:r>
+              <a:rPr lang="en-US" dirty="0"/>
+              <a:t>× </a:t>
+            </a:r>
+            <a:r>
+              <a:rPr lang="en-US" dirty="0" smtClean="0"/>
+              <a:t>10</a:t>
+            </a:r>
+            <a:r>
+              <a:rPr lang="en-US" baseline="30000" dirty="0" smtClean="0"/>
+              <a:t>8 </a:t>
+            </a:r>
+            <a:r>
+              <a:rPr lang="en-US" dirty="0" smtClean="0">
+                <a:solidFill>
+                  <a:prstClr val="black"/>
+                </a:solidFill>
+              </a:rPr>
+              <a:t>events</a:t>
+            </a:r>
+            <a:endParaRPr lang="en-US" dirty="0">
+              <a:solidFill>
+                <a:prstClr val="black"/>
+              </a:solidFill>
+            </a:endParaRPr>
+          </a:p>
+          <a:p>
+            <a:pPr lvl="1">
+              <a:buClr>
+                <a:srgbClr val="4584D3"/>
+              </a:buClr>
+            </a:pPr>
+            <a:r>
+              <a:rPr lang="en-US" dirty="0"/>
+              <a:t>e e </a:t>
+            </a:r>
+            <a:r>
+              <a:rPr lang="en-US" dirty="0">
+                <a:solidFill>
+                  <a:srgbClr val="2F2B20"/>
+                </a:solidFill>
+                <a:latin typeface="+mj-lt"/>
+              </a:rPr>
+              <a:t>→</a:t>
+            </a:r>
+            <a:r>
               <a:rPr lang="en-US" sz="1600" dirty="0">
                 <a:solidFill>
                   <a:srgbClr val="2F2B20"/>
@@ -5748,13 +6208,94 @@
             </a:r>
             <a:r>
               <a:rPr lang="en-US" dirty="0"/>
-              <a:t>μ μ </a:t>
-            </a:r>
-            <a:r>
-              <a:rPr lang="en-US" dirty="0" smtClean="0"/>
-              <a:t>γ</a:t>
-            </a:r>
-            <a:endParaRPr lang="en-US" dirty="0"/>
+              <a:t>μ μ γ</a:t>
+            </a:r>
+            <a:r>
+              <a:rPr lang="en-US" dirty="0">
+                <a:solidFill>
+                  <a:prstClr val="black"/>
+                </a:solidFill>
+              </a:rPr>
+              <a:t>	</a:t>
+            </a:r>
+            <a:r>
+              <a:rPr lang="fr-FR" dirty="0">
+                <a:solidFill>
+                  <a:prstClr val="black"/>
+                </a:solidFill>
+                <a:latin typeface="Cambria"/>
+              </a:rPr>
+              <a:t>~</a:t>
+            </a:r>
+            <a:r>
+              <a:rPr lang="fr-FR" dirty="0">
+                <a:solidFill>
+                  <a:prstClr val="black"/>
+                </a:solidFill>
+              </a:rPr>
+              <a:t> </a:t>
+            </a:r>
+            <a:r>
+              <a:rPr lang="fr-FR" dirty="0" smtClean="0">
+                <a:solidFill>
+                  <a:prstClr val="black"/>
+                </a:solidFill>
+              </a:rPr>
+              <a:t>125 </a:t>
+            </a:r>
+            <a:r>
+              <a:rPr lang="en-US" dirty="0"/>
+              <a:t>× </a:t>
+            </a:r>
+            <a:r>
+              <a:rPr lang="en-US" dirty="0" smtClean="0"/>
+              <a:t>10</a:t>
+            </a:r>
+            <a:r>
+              <a:rPr lang="en-US" baseline="30000" dirty="0" smtClean="0"/>
+              <a:t>8 </a:t>
+            </a:r>
+            <a:r>
+              <a:rPr lang="en-US" dirty="0" smtClean="0">
+                <a:solidFill>
+                  <a:prstClr val="black"/>
+                </a:solidFill>
+              </a:rPr>
+              <a:t>events</a:t>
+            </a:r>
+            <a:endParaRPr lang="en-US" dirty="0">
+              <a:solidFill>
+                <a:prstClr val="black"/>
+              </a:solidFill>
+            </a:endParaRPr>
+          </a:p>
+          <a:p>
+            <a:pPr>
+              <a:buClr>
+                <a:srgbClr val="4584D3"/>
+              </a:buClr>
+            </a:pPr>
+            <a:endParaRPr lang="en-US" dirty="0" smtClean="0">
+              <a:solidFill>
+                <a:prstClr val="black"/>
+              </a:solidFill>
+            </a:endParaRPr>
+          </a:p>
+          <a:p>
+            <a:pPr lvl="1"/>
+            <a:endParaRPr lang="en-US" dirty="0">
+              <a:solidFill>
+                <a:prstClr val="black"/>
+              </a:solidFill>
+            </a:endParaRPr>
+          </a:p>
+          <a:p>
+            <a:pPr marL="411480" lvl="1" indent="0">
+              <a:buNone/>
+            </a:pPr>
+            <a:endParaRPr lang="en-US" dirty="0" smtClean="0">
+              <a:latin typeface="+mj-lt"/>
+            </a:endParaRPr>
           </a:p>
         </p:txBody>
       </p:sp>
@@ -5779,6 +6320,249 @@
               <a:t>10</a:t>
             </a:fld>
             <a:endParaRPr lang="en-US" dirty="0"/>
+          </a:p>
+        </p:txBody>
+      </p:sp>
+      <p:sp>
+        <p:nvSpPr>
+          <p:cNvPr id="5" name="TextBox 4"/>
+          <p:cNvSpPr txBox="1"/>
+          <p:nvPr/>
+        </p:nvSpPr>
+        <p:spPr>
+          <a:xfrm>
+            <a:off x="4892842" y="2340549"/>
+            <a:ext cx="3382211" cy="830997"/>
+          </a:xfrm>
+          <a:prstGeom prst="rect">
+            <a:avLst/>
+          </a:prstGeom>
+          <a:noFill/>
+        </p:spPr>
+        <p:txBody>
+          <a:bodyPr wrap="square" rtlCol="0">
+            <a:spAutoFit/>
+          </a:bodyPr>
+          <a:lstStyle/>
+          <a:p>
+            <a:pPr algn="just"/>
+            <a:r>
+              <a:rPr lang="en-US" sz="2400" dirty="0" smtClean="0"/>
+              <a:t>× 50 more luminosity at</a:t>
+            </a:r>
+          </a:p>
+          <a:p>
+            <a:pPr algn="just"/>
+            <a:r>
+              <a:rPr lang="en-US" sz="2400" dirty="0" smtClean="0"/>
+              <a:t>Belle II compared to Belle</a:t>
+            </a:r>
+          </a:p>
+        </p:txBody>
+      </p:sp>
+      <p:sp>
+        <p:nvSpPr>
+          <p:cNvPr id="6" name="Right Brace 5"/>
+          <p:cNvSpPr/>
+          <p:nvPr/>
+        </p:nvSpPr>
+        <p:spPr>
+          <a:xfrm>
+            <a:off x="4598737" y="4318000"/>
+            <a:ext cx="473070" cy="1066800"/>
+          </a:xfrm>
+          <a:prstGeom prst="rightBrace">
+            <a:avLst>
+              <a:gd name="adj1" fmla="val 53782"/>
+              <a:gd name="adj2" fmla="val 50768"/>
+            </a:avLst>
+          </a:prstGeom>
+          <a:ln>
+            <a:solidFill>
+              <a:schemeClr val="tx1"/>
+            </a:solidFill>
+          </a:ln>
+        </p:spPr>
+        <p:style>
+          <a:lnRef idx="2">
+            <a:schemeClr val="accent1"/>
+          </a:lnRef>
+          <a:fillRef idx="0">
+            <a:schemeClr val="accent1"/>
+          </a:fillRef>
+          <a:effectRef idx="1">
+            <a:schemeClr val="accent1"/>
+          </a:effectRef>
+          <a:fontRef idx="minor">
+            <a:schemeClr val="tx1"/>
+          </a:fontRef>
+        </p:style>
+        <p:txBody>
+          <a:bodyPr rtlCol="0" anchor="ctr"/>
+          <a:lstStyle/>
+          <a:p>
+            <a:pPr algn="ctr"/>
+            <a:endParaRPr lang="en-US"/>
+          </a:p>
+        </p:txBody>
+      </p:sp>
+      <p:sp>
+        <p:nvSpPr>
+          <p:cNvPr id="7" name="TextBox 6"/>
+          <p:cNvSpPr txBox="1"/>
+          <p:nvPr/>
+        </p:nvSpPr>
+        <p:spPr>
+          <a:xfrm>
+            <a:off x="5071807" y="4549068"/>
+            <a:ext cx="3310194" cy="584776"/>
+          </a:xfrm>
+          <a:prstGeom prst="rect">
+            <a:avLst/>
+          </a:prstGeom>
+          <a:noFill/>
+        </p:spPr>
+        <p:txBody>
+          <a:bodyPr wrap="square" rtlCol="0">
+            <a:spAutoFit/>
+          </a:bodyPr>
+          <a:lstStyle/>
+          <a:p>
+            <a:pPr algn="ctr"/>
+            <a:r>
+              <a:rPr lang="en-US" sz="1600" dirty="0" smtClean="0"/>
+              <a:t>at my current BG efficiencies (10</a:t>
+            </a:r>
+            <a:r>
+              <a:rPr lang="en-US" sz="1600" baseline="30000" dirty="0" smtClean="0"/>
+              <a:t>-4 </a:t>
+            </a:r>
+            <a:r>
+              <a:rPr lang="en-US" sz="1600" dirty="0" smtClean="0"/>
+              <a:t>%):</a:t>
+            </a:r>
+          </a:p>
+          <a:p>
+            <a:pPr algn="ctr"/>
+            <a:r>
+              <a:rPr lang="en-US" sz="1600" dirty="0">
+                <a:solidFill>
+                  <a:prstClr val="black"/>
+                </a:solidFill>
+                <a:latin typeface="Cambria"/>
+              </a:rPr>
+              <a:t>~</a:t>
+            </a:r>
+            <a:r>
+              <a:rPr lang="en-US" sz="1600" dirty="0" smtClean="0"/>
+              <a:t>10,000 background events</a:t>
+            </a:r>
+          </a:p>
+        </p:txBody>
+      </p:sp>
+      <p:sp>
+        <p:nvSpPr>
+          <p:cNvPr id="8" name="TextBox 7"/>
+          <p:cNvSpPr txBox="1"/>
+          <p:nvPr/>
+        </p:nvSpPr>
+        <p:spPr>
+          <a:xfrm>
+            <a:off x="4998064" y="5397931"/>
+            <a:ext cx="3462591" cy="338554"/>
+          </a:xfrm>
+          <a:prstGeom prst="rect">
+            <a:avLst/>
+          </a:prstGeom>
+          <a:noFill/>
+        </p:spPr>
+        <p:txBody>
+          <a:bodyPr wrap="square" rtlCol="0">
+            <a:spAutoFit/>
+          </a:bodyPr>
+          <a:lstStyle/>
+          <a:p>
+            <a:pPr algn="ctr"/>
+            <a:r>
+              <a:rPr lang="en-US" sz="1600" dirty="0" smtClean="0"/>
+              <a:t>e </a:t>
+            </a:r>
+            <a:r>
+              <a:rPr lang="en-US" sz="1600" dirty="0"/>
+              <a:t>e </a:t>
+            </a:r>
+            <a:r>
+              <a:rPr lang="en-US" sz="1600" dirty="0">
+                <a:solidFill>
+                  <a:srgbClr val="2F2B20"/>
+                </a:solidFill>
+                <a:latin typeface="+mj-lt"/>
+              </a:rPr>
+              <a:t>→</a:t>
+            </a:r>
+            <a:r>
+              <a:rPr lang="en-US" sz="1600" dirty="0">
+                <a:solidFill>
+                  <a:srgbClr val="2F2B20"/>
+                </a:solidFill>
+              </a:rPr>
+              <a:t> </a:t>
+            </a:r>
+            <a:r>
+              <a:rPr lang="en-US" sz="1600" dirty="0"/>
+              <a:t>μ μ </a:t>
+            </a:r>
+            <a:r>
+              <a:rPr lang="en-US" sz="1600" dirty="0" smtClean="0"/>
+              <a:t>γ background not yet studied</a:t>
+            </a:r>
+            <a:endParaRPr lang="en-US" sz="1600" dirty="0"/>
+          </a:p>
+        </p:txBody>
+      </p:sp>
+      <p:sp>
+        <p:nvSpPr>
+          <p:cNvPr id="9" name="Right Brace 8"/>
+          <p:cNvSpPr/>
+          <p:nvPr/>
+        </p:nvSpPr>
+        <p:spPr>
+          <a:xfrm>
+            <a:off x="4589663" y="5481483"/>
+            <a:ext cx="170771" cy="240613"/>
+          </a:xfrm>
+          <a:prstGeom prst="rightBrace">
+            <a:avLst>
+              <a:gd name="adj1" fmla="val 53782"/>
+              <a:gd name="adj2" fmla="val 50768"/>
+            </a:avLst>
+          </a:prstGeom>
+          <a:ln>
+            <a:solidFill>
+              <a:schemeClr val="tx1"/>
+            </a:solidFill>
+          </a:ln>
+        </p:spPr>
+        <p:style>
+          <a:lnRef idx="2">
+            <a:schemeClr val="accent1"/>
+          </a:lnRef>
+          <a:fillRef idx="0">
+            <a:schemeClr val="accent1"/>
+          </a:fillRef>
+          <a:effectRef idx="1">
+            <a:schemeClr val="accent1"/>
+          </a:effectRef>
+          <a:fontRef idx="minor">
+            <a:schemeClr val="tx1"/>
+          </a:fontRef>
+        </p:style>
+        <p:txBody>
+          <a:bodyPr rtlCol="0" anchor="ctr"/>
+          <a:lstStyle/>
+          <a:p>
+            <a:pPr algn="ctr"/>
+            <a:endParaRPr lang="en-US"/>
           </a:p>
         </p:txBody>
       </p:sp>
@@ -5836,45 +6620,9 @@
           <a:p>
             <a:r>
               <a:rPr lang="en-US" dirty="0" smtClean="0"/>
-              <a:t>Belle &amp; Belle II</a:t>
-            </a:r>
-            <a:endParaRPr lang="en-US" dirty="0"/>
-          </a:p>
-        </p:txBody>
-      </p:sp>
-      <p:sp>
-        <p:nvSpPr>
-          <p:cNvPr id="3" name="Content Placeholder 2"/>
-          <p:cNvSpPr>
-            <a:spLocks noGrp="1"/>
-          </p:cNvSpPr>
-          <p:nvPr>
-            <p:ph idx="1"/>
-          </p:nvPr>
-        </p:nvSpPr>
-        <p:spPr/>
-        <p:txBody>
-          <a:bodyPr/>
-          <a:lstStyle/>
-          <a:p>
-            <a:r>
-              <a:rPr lang="en-US" dirty="0" smtClean="0"/>
-              <a:t>Belle II ~ 50 billion tau pairs</a:t>
-            </a:r>
-          </a:p>
-          <a:p>
-            <a:pPr lvl="1"/>
-            <a:r>
-              <a:rPr lang="en-US" dirty="0" smtClean="0"/>
-              <a:t>no. of tau pairs produced</a:t>
-            </a:r>
-          </a:p>
-          <a:p>
-            <a:pPr lvl="1"/>
-            <a:r>
-              <a:rPr lang="en-US" dirty="0" smtClean="0"/>
-              <a:t>no. of background events expected (efficiency)</a:t>
-            </a:r>
+              <a:t>Current searches</a:t>
+            </a:r>
+            <a:endParaRPr lang="en-US" dirty="0"/>
           </a:p>
         </p:txBody>
       </p:sp>
@@ -5897,90 +6645,6 @@
               <a:rPr lang="en-US" smtClean="0"/>
               <a:pPr/>
               <a:t>11</a:t>
-            </a:fld>
-            <a:endParaRPr lang="en-US" dirty="0"/>
-          </a:p>
-        </p:txBody>
-      </p:sp>
-    </p:spTree>
-    <p:extLst>
-      <p:ext uri="{BB962C8B-B14F-4D97-AF65-F5344CB8AC3E}">
-        <p14:creationId xmlns:p14="http://schemas.microsoft.com/office/powerpoint/2010/main" val="3043979170"/>
-      </p:ext>
-    </p:extLst>
-  </p:cSld>
-  <p:clrMapOvr>
-    <a:masterClrMapping/>
-  </p:clrMapOvr>
-  <p:timing>
-    <p:tnLst>
-      <p:par>
-        <p:cTn xmlns:p14="http://schemas.microsoft.com/office/powerpoint/2010/main" id="1" dur="indefinite" restart="never" nodeType="tmRoot"/>
-      </p:par>
-    </p:tnLst>
-  </p:timing>
-</p:sld>
-</file>
-
-<file path=ppt/slides/slide12.xml><?xml version="1.0" encoding="utf-8"?>
-<p:sld xmlns:a="http://schemas.openxmlformats.org/drawingml/2006/main" xmlns:r="http://schemas.openxmlformats.org/officeDocument/2006/relationships" xmlns:p="http://schemas.openxmlformats.org/presentationml/2006/main">
-  <p:cSld>
-    <p:spTree>
-      <p:nvGrpSpPr>
-        <p:cNvPr id="1" name=""/>
-        <p:cNvGrpSpPr/>
-        <p:nvPr/>
-      </p:nvGrpSpPr>
-      <p:grpSpPr>
-        <a:xfrm>
-          <a:off x="0" y="0"/>
-          <a:ext cx="0" cy="0"/>
-          <a:chOff x="0" y="0"/>
-          <a:chExt cx="0" cy="0"/>
-        </a:xfrm>
-      </p:grpSpPr>
-      <p:sp>
-        <p:nvSpPr>
-          <p:cNvPr id="2" name="Title 1"/>
-          <p:cNvSpPr>
-            <a:spLocks noGrp="1"/>
-          </p:cNvSpPr>
-          <p:nvPr>
-            <p:ph type="title"/>
-          </p:nvPr>
-        </p:nvSpPr>
-        <p:spPr/>
-        <p:txBody>
-          <a:bodyPr/>
-          <a:lstStyle/>
-          <a:p>
-            <a:r>
-              <a:rPr lang="en-US" dirty="0" smtClean="0"/>
-              <a:t>Current searches</a:t>
-            </a:r>
-            <a:endParaRPr lang="en-US" dirty="0"/>
-          </a:p>
-        </p:txBody>
-      </p:sp>
-      <p:sp>
-        <p:nvSpPr>
-          <p:cNvPr id="4" name="Slide Number Placeholder 3"/>
-          <p:cNvSpPr>
-            <a:spLocks noGrp="1"/>
-          </p:cNvSpPr>
-          <p:nvPr>
-            <p:ph type="sldNum" sz="quarter" idx="12"/>
-          </p:nvPr>
-        </p:nvSpPr>
-        <p:spPr/>
-        <p:txBody>
-          <a:bodyPr/>
-          <a:lstStyle/>
-          <a:p>
-            <a:fld id="{BA9B540C-44DA-4F69-89C9-7C84606640D3}" type="slidenum">
-              <a:rPr lang="en-US" smtClean="0"/>
-              <a:pPr/>
-              <a:t>12</a:t>
             </a:fld>
             <a:endParaRPr lang="en-US" dirty="0"/>
           </a:p>
@@ -6053,10 +6717,10 @@
           </p:nvGrpSpPr>
           <p:grpSpPr>
             <a:xfrm>
-              <a:off x="645576" y="1819275"/>
-              <a:ext cx="3063897" cy="1341767"/>
-              <a:chOff x="683163" y="1761058"/>
-              <a:chExt cx="3675224" cy="1609484"/>
+              <a:off x="582613" y="1806575"/>
+              <a:ext cx="3041650" cy="1354138"/>
+              <a:chOff x="607637" y="1745824"/>
+              <a:chExt cx="3648539" cy="1624323"/>
             </a:xfrm>
           </p:grpSpPr>
           <p:graphicFrame>
@@ -6068,25 +6732,25 @@
               <p:nvPr>
                 <p:extLst>
                   <p:ext uri="{D42A27DB-BD31-4B8C-83A1-F6EECF244321}">
-                    <p14:modId xmlns:p14="http://schemas.microsoft.com/office/powerpoint/2010/main" val="3558671555"/>
+                    <p14:modId xmlns:p14="http://schemas.microsoft.com/office/powerpoint/2010/main" val="1658873570"/>
                   </p:ext>
                 </p:extLst>
               </p:nvPr>
             </p:nvGraphicFramePr>
             <p:xfrm>
-              <a:off x="1398436" y="2409894"/>
-              <a:ext cx="2959951" cy="960648"/>
+              <a:off x="1496920" y="2410407"/>
+              <a:ext cx="2759256" cy="959740"/>
             </p:xfrm>
             <a:graphic>
               <a:graphicData uri="http://schemas.openxmlformats.org/presentationml/2006/ole">
                 <mc:AlternateContent xmlns:mc="http://schemas.openxmlformats.org/markup-compatibility/2006">
                   <mc:Choice xmlns:v="urn:schemas-microsoft-com:vml" Requires="v">
-                    <p:oleObj spid="_x0000_s3030" name="Equation" r:id="rId4" imgW="1485900" imgH="482600" progId="Equation.3">
+                    <p:oleObj spid="_x0000_s9763" name="Equation" r:id="rId4" imgW="1384300" imgH="482600" progId="Equation.3">
                       <p:embed/>
                     </p:oleObj>
                   </mc:Choice>
                   <mc:Fallback>
-                    <p:oleObj name="Equation" r:id="rId4" imgW="1485900" imgH="482600" progId="Equation.3">
+                    <p:oleObj name="Equation" r:id="rId4" imgW="1384300" imgH="482600" progId="Equation.3">
                       <p:embed/>
                       <p:pic>
                         <p:nvPicPr>
@@ -6102,8 +6766,8 @@
                         </p:blipFill>
                         <p:spPr>
                           <a:xfrm>
-                            <a:off x="1398436" y="2409894"/>
-                            <a:ext cx="2959951" cy="960648"/>
+                            <a:off x="1496920" y="2410407"/>
+                            <a:ext cx="2759256" cy="959740"/>
                           </a:xfrm>
                           <a:prstGeom prst="rect">
                             <a:avLst/>
@@ -6125,25 +6789,25 @@
               <p:nvPr>
                 <p:extLst>
                   <p:ext uri="{D42A27DB-BD31-4B8C-83A1-F6EECF244321}">
-                    <p14:modId xmlns:p14="http://schemas.microsoft.com/office/powerpoint/2010/main" val="2149042160"/>
+                    <p14:modId xmlns:p14="http://schemas.microsoft.com/office/powerpoint/2010/main" val="3823082336"/>
                   </p:ext>
                 </p:extLst>
               </p:nvPr>
             </p:nvGraphicFramePr>
             <p:xfrm>
-              <a:off x="683163" y="1761058"/>
-              <a:ext cx="3418125" cy="554136"/>
+              <a:off x="607637" y="1745824"/>
+              <a:ext cx="3572368" cy="584604"/>
             </p:xfrm>
             <a:graphic>
               <a:graphicData uri="http://schemas.openxmlformats.org/presentationml/2006/ole">
                 <mc:AlternateContent xmlns:mc="http://schemas.openxmlformats.org/markup-compatibility/2006">
                   <mc:Choice xmlns:v="urn:schemas-microsoft-com:vml" Requires="v">
-                    <p:oleObj spid="_x0000_s3031" name="Equation" r:id="rId6" imgW="1409700" imgH="228600" progId="Equation.3">
+                    <p:oleObj spid="_x0000_s9764" name="Equation" r:id="rId6" imgW="1473200" imgH="241300" progId="Equation.3">
                       <p:embed/>
                     </p:oleObj>
                   </mc:Choice>
                   <mc:Fallback>
-                    <p:oleObj name="Equation" r:id="rId6" imgW="1409700" imgH="228600" progId="Equation.3">
+                    <p:oleObj name="Equation" r:id="rId6" imgW="1473200" imgH="241300" progId="Equation.3">
                       <p:embed/>
                       <p:pic>
                         <p:nvPicPr>
@@ -6159,8 +6823,8 @@
                         </p:blipFill>
                         <p:spPr>
                           <a:xfrm>
-                            <a:off x="683163" y="1761058"/>
-                            <a:ext cx="3418125" cy="554136"/>
+                            <a:off x="607637" y="1745824"/>
+                            <a:ext cx="3572368" cy="584604"/>
                           </a:xfrm>
                           <a:prstGeom prst="rect">
                             <a:avLst/>
@@ -6183,10 +6847,10 @@
         </p:nvGrpSpPr>
         <p:grpSpPr>
           <a:xfrm>
-            <a:off x="463722" y="4408488"/>
-            <a:ext cx="3265042" cy="1358024"/>
-            <a:chOff x="463722" y="4408488"/>
-            <a:chExt cx="3265042" cy="1358024"/>
+            <a:off x="374650" y="4395788"/>
+            <a:ext cx="3319463" cy="1370012"/>
+            <a:chOff x="374650" y="4395788"/>
+            <a:chExt cx="3319463" cy="1370012"/>
           </a:xfrm>
         </p:grpSpPr>
         <p:graphicFrame>
@@ -6198,25 +6862,25 @@
             <p:nvPr>
               <p:extLst>
                 <p:ext uri="{D42A27DB-BD31-4B8C-83A1-F6EECF244321}">
-                  <p14:modId xmlns:p14="http://schemas.microsoft.com/office/powerpoint/2010/main" val="1293610258"/>
+                  <p14:modId xmlns:p14="http://schemas.microsoft.com/office/powerpoint/2010/main" val="1130313554"/>
                 </p:ext>
               </p:extLst>
             </p:nvPr>
           </p:nvGraphicFramePr>
           <p:xfrm>
-            <a:off x="1255445" y="4971153"/>
-            <a:ext cx="2473319" cy="795359"/>
+            <a:off x="1338263" y="4970463"/>
+            <a:ext cx="2305050" cy="795337"/>
           </p:xfrm>
           <a:graphic>
             <a:graphicData uri="http://schemas.openxmlformats.org/presentationml/2006/ole">
               <mc:AlternateContent xmlns:mc="http://schemas.openxmlformats.org/markup-compatibility/2006">
                 <mc:Choice xmlns:v="urn:schemas-microsoft-com:vml" Requires="v">
-                  <p:oleObj spid="_x0000_s3032" name="Equation" r:id="rId8" imgW="1498600" imgH="482600" progId="Equation.3">
+                  <p:oleObj spid="_x0000_s9765" name="Equation" r:id="rId8" imgW="1397000" imgH="482600" progId="Equation.3">
                     <p:embed/>
                   </p:oleObj>
                 </mc:Choice>
                 <mc:Fallback>
-                  <p:oleObj name="Equation" r:id="rId8" imgW="1498600" imgH="482600" progId="Equation.3">
+                  <p:oleObj name="Equation" r:id="rId8" imgW="1397000" imgH="482600" progId="Equation.3">
                     <p:embed/>
                     <p:pic>
                       <p:nvPicPr>
@@ -6232,8 +6896,8 @@
                       </p:blipFill>
                       <p:spPr>
                         <a:xfrm>
-                          <a:off x="1255445" y="4971153"/>
-                          <a:ext cx="2473319" cy="795359"/>
+                          <a:off x="1338263" y="4970463"/>
+                          <a:ext cx="2305050" cy="795337"/>
                         </a:xfrm>
                         <a:prstGeom prst="rect">
                           <a:avLst/>
@@ -6255,25 +6919,25 @@
             <p:nvPr>
               <p:extLst>
                 <p:ext uri="{D42A27DB-BD31-4B8C-83A1-F6EECF244321}">
-                  <p14:modId xmlns:p14="http://schemas.microsoft.com/office/powerpoint/2010/main" val="979675610"/>
+                  <p14:modId xmlns:p14="http://schemas.microsoft.com/office/powerpoint/2010/main" val="437363629"/>
                 </p:ext>
               </p:extLst>
             </p:nvPr>
           </p:nvGraphicFramePr>
           <p:xfrm>
-            <a:off x="463722" y="4408488"/>
-            <a:ext cx="3140075" cy="460375"/>
+            <a:off x="374650" y="4395788"/>
+            <a:ext cx="3319463" cy="485775"/>
           </p:xfrm>
           <a:graphic>
             <a:graphicData uri="http://schemas.openxmlformats.org/presentationml/2006/ole">
               <mc:AlternateContent xmlns:mc="http://schemas.openxmlformats.org/markup-compatibility/2006">
                 <mc:Choice xmlns:v="urn:schemas-microsoft-com:vml" Requires="v">
-                  <p:oleObj spid="_x0000_s3033" name="Equation" r:id="rId10" imgW="1562100" imgH="228600" progId="Equation.3">
+                  <p:oleObj spid="_x0000_s9766" name="Equation" r:id="rId10" imgW="1651000" imgH="241300" progId="Equation.3">
                     <p:embed/>
                   </p:oleObj>
                 </mc:Choice>
                 <mc:Fallback>
-                  <p:oleObj name="Equation" r:id="rId10" imgW="1562100" imgH="228600" progId="Equation.3">
+                  <p:oleObj name="Equation" r:id="rId10" imgW="1651000" imgH="241300" progId="Equation.3">
                     <p:embed/>
                     <p:pic>
                       <p:nvPicPr>
@@ -6289,8 +6953,8 @@
                       </p:blipFill>
                       <p:spPr>
                         <a:xfrm>
-                          <a:off x="463722" y="4408488"/>
-                          <a:ext cx="3140075" cy="460375"/>
+                          <a:off x="374650" y="4395788"/>
+                          <a:ext cx="3319463" cy="485775"/>
                         </a:xfrm>
                         <a:prstGeom prst="rect">
                           <a:avLst/>
@@ -6507,7 +7171,14 @@
                 <a:ea typeface="Lucida Grande"/>
                 <a:cs typeface="Lucida Grande"/>
               </a:rPr>
-              <a:t>at Babar(</a:t>
+              <a:t>at </a:t>
+            </a:r>
+            <a:r>
+              <a:rPr lang="en-US" sz="1400" dirty="0" smtClean="0">
+                <a:ea typeface="Lucida Grande"/>
+                <a:cs typeface="Lucida Grande"/>
+              </a:rPr>
+              <a:t>Babar (</a:t>
             </a:r>
             <a:r>
               <a:rPr lang="en-US" sz="1400" i="1" dirty="0" smtClean="0">
@@ -6551,7 +7222,7 @@
 </p:sld>
 </file>
 
-<file path=ppt/slides/slide13.xml><?xml version="1.0" encoding="utf-8"?>
+<file path=ppt/slides/slide12.xml><?xml version="1.0" encoding="utf-8"?>
 <p:sld xmlns:a="http://schemas.openxmlformats.org/drawingml/2006/main" xmlns:r="http://schemas.openxmlformats.org/officeDocument/2006/relationships" xmlns:p="http://schemas.openxmlformats.org/presentationml/2006/main">
   <p:cSld>
     <p:spTree>
@@ -6609,7 +7280,7 @@
             <a:fld id="{BA9B540C-44DA-4F69-89C9-7C84606640D3}" type="slidenum">
               <a:rPr lang="en-US" smtClean="0"/>
               <a:pPr/>
-              <a:t>13</a:t>
+              <a:t>12</a:t>
             </a:fld>
             <a:endParaRPr lang="en-US" dirty="0"/>
           </a:p>
@@ -6699,25 +7370,25 @@
           <p:nvPr>
             <p:extLst>
               <p:ext uri="{D42A27DB-BD31-4B8C-83A1-F6EECF244321}">
-                <p14:modId xmlns:p14="http://schemas.microsoft.com/office/powerpoint/2010/main" val="3758182958"/>
+                <p14:modId xmlns:p14="http://schemas.microsoft.com/office/powerpoint/2010/main" val="1737942976"/>
               </p:ext>
             </p:extLst>
           </p:nvPr>
         </p:nvGraphicFramePr>
         <p:xfrm>
-          <a:off x="1380067" y="1757524"/>
-          <a:ext cx="2091266" cy="685070"/>
+          <a:off x="1443038" y="1757363"/>
+          <a:ext cx="1965325" cy="685800"/>
         </p:xfrm>
         <a:graphic>
           <a:graphicData uri="http://schemas.openxmlformats.org/presentationml/2006/ole">
             <mc:AlternateContent xmlns:mc="http://schemas.openxmlformats.org/markup-compatibility/2006">
               <mc:Choice xmlns:v="urn:schemas-microsoft-com:vml" Requires="v">
-                <p:oleObj spid="_x0000_s2004" name="Equation" r:id="rId5" imgW="1473200" imgH="482600" progId="Equation.3">
+                <p:oleObj spid="_x0000_s10785" name="Equation" r:id="rId5" imgW="1384300" imgH="482600" progId="Equation.3">
                   <p:embed/>
                 </p:oleObj>
               </mc:Choice>
               <mc:Fallback>
-                <p:oleObj name="Equation" r:id="rId5" imgW="1473200" imgH="482600" progId="Equation.3">
+                <p:oleObj name="Equation" r:id="rId5" imgW="1384300" imgH="482600" progId="Equation.3">
                   <p:embed/>
                   <p:pic>
                     <p:nvPicPr>
@@ -6733,8 +7404,8 @@
                     </p:blipFill>
                     <p:spPr>
                       <a:xfrm>
-                        <a:off x="1380067" y="1757524"/>
-                        <a:ext cx="2091266" cy="685070"/>
+                        <a:off x="1443038" y="1757363"/>
+                        <a:ext cx="1965325" cy="685800"/>
                       </a:xfrm>
                       <a:prstGeom prst="rect">
                         <a:avLst/>
@@ -6756,25 +7427,25 @@
           <p:nvPr>
             <p:extLst>
               <p:ext uri="{D42A27DB-BD31-4B8C-83A1-F6EECF244321}">
-                <p14:modId xmlns:p14="http://schemas.microsoft.com/office/powerpoint/2010/main" val="2181965513"/>
+                <p14:modId xmlns:p14="http://schemas.microsoft.com/office/powerpoint/2010/main" val="356256036"/>
               </p:ext>
             </p:extLst>
           </p:nvPr>
         </p:nvGraphicFramePr>
         <p:xfrm>
-          <a:off x="4949825" y="1757363"/>
-          <a:ext cx="2127250" cy="685800"/>
+          <a:off x="5029200" y="1757363"/>
+          <a:ext cx="1965325" cy="685800"/>
         </p:xfrm>
         <a:graphic>
           <a:graphicData uri="http://schemas.openxmlformats.org/presentationml/2006/ole">
             <mc:AlternateContent xmlns:mc="http://schemas.openxmlformats.org/markup-compatibility/2006">
               <mc:Choice xmlns:v="urn:schemas-microsoft-com:vml" Requires="v">
-                <p:oleObj spid="_x0000_s2005" name="Equation" r:id="rId7" imgW="1498600" imgH="482600" progId="Equation.3">
+                <p:oleObj spid="_x0000_s10786" name="Equation" r:id="rId7" imgW="1384300" imgH="482600" progId="Equation.3">
                   <p:embed/>
                 </p:oleObj>
               </mc:Choice>
               <mc:Fallback>
-                <p:oleObj name="Equation" r:id="rId7" imgW="1498600" imgH="482600" progId="Equation.3">
+                <p:oleObj name="Equation" r:id="rId7" imgW="1384300" imgH="482600" progId="Equation.3">
                   <p:embed/>
                   <p:pic>
                     <p:nvPicPr>
@@ -6790,8 +7461,8 @@
                     </p:blipFill>
                     <p:spPr>
                       <a:xfrm>
-                        <a:off x="4949825" y="1757363"/>
-                        <a:ext cx="2127250" cy="685800"/>
+                        <a:off x="5029200" y="1757363"/>
+                        <a:ext cx="1965325" cy="685800"/>
                       </a:xfrm>
                       <a:prstGeom prst="rect">
                         <a:avLst/>
@@ -6826,7 +7497,7 @@
           <a:graphicData uri="http://schemas.openxmlformats.org/presentationml/2006/ole">
             <mc:AlternateContent xmlns:mc="http://schemas.openxmlformats.org/markup-compatibility/2006">
               <mc:Choice xmlns:v="urn:schemas-microsoft-com:vml" Requires="v">
-                <p:oleObj spid="_x0000_s2006" name="Equation" r:id="rId9" imgW="965200" imgH="215900" progId="Equation.3">
+                <p:oleObj spid="_x0000_s10787" name="Equation" r:id="rId9" imgW="965200" imgH="215900" progId="Equation.3">
                   <p:embed/>
                 </p:oleObj>
               </mc:Choice>
@@ -6883,7 +7554,7 @@
           <a:graphicData uri="http://schemas.openxmlformats.org/presentationml/2006/ole">
             <mc:AlternateContent xmlns:mc="http://schemas.openxmlformats.org/markup-compatibility/2006">
               <mc:Choice xmlns:v="urn:schemas-microsoft-com:vml" Requires="v">
-                <p:oleObj spid="_x0000_s2007" name="Equation" r:id="rId11" imgW="1054100" imgH="215900" progId="Equation.3">
+                <p:oleObj spid="_x0000_s10788" name="Equation" r:id="rId11" imgW="1054100" imgH="215900" progId="Equation.3">
                   <p:embed/>
                 </p:oleObj>
               </mc:Choice>
@@ -6938,7 +7609,7 @@
 </p:sld>
 </file>
 
-<file path=ppt/slides/slide14.xml><?xml version="1.0" encoding="utf-8"?>
+<file path=ppt/slides/slide13.xml><?xml version="1.0" encoding="utf-8"?>
 <p:sld xmlns:a="http://schemas.openxmlformats.org/drawingml/2006/main" xmlns:r="http://schemas.openxmlformats.org/officeDocument/2006/relationships" xmlns:p="http://schemas.openxmlformats.org/presentationml/2006/main">
   <p:cSld>
     <p:spTree>
@@ -6995,11 +7666,7 @@
           <a:p>
             <a:r>
               <a:rPr lang="en-US" dirty="0" smtClean="0"/>
-              <a:t>approx </a:t>
-            </a:r>
-            <a:r>
-              <a:rPr lang="en-US" dirty="0" smtClean="0"/>
-              <a:t>1.5 million signal (</a:t>
+              <a:t>approx 1.5 million signal (</a:t>
             </a:r>
             <a:r>
               <a:rPr lang="en-US" dirty="0"/>
@@ -7021,24 +7688,22 @@
             </a:r>
             <a:r>
               <a:rPr lang="en-US" dirty="0" smtClean="0"/>
-              <a:t>) MC events </a:t>
-            </a:r>
-            <a:r>
-              <a:rPr lang="en-US" dirty="0" smtClean="0"/>
-              <a:t>produced</a:t>
-            </a:r>
-            <a:endParaRPr lang="en-US" dirty="0" smtClean="0"/>
-          </a:p>
-          <a:p>
-            <a:r>
-              <a:rPr lang="en-US" dirty="0" smtClean="0"/>
-              <a:t>approx 3500 million generic (tau-pair) MC events produced by the Belle II </a:t>
-            </a:r>
-            <a:r>
-              <a:rPr lang="en-US" dirty="0" smtClean="0"/>
-              <a:t>Collaboration</a:t>
-            </a:r>
-            <a:endParaRPr lang="en-US" dirty="0" smtClean="0"/>
+              <a:t>) MC events produced</a:t>
+            </a:r>
+          </a:p>
+          <a:p>
+            <a:r>
+              <a:rPr lang="en-US" dirty="0" smtClean="0"/>
+              <a:t>approx </a:t>
+            </a:r>
+            <a:r>
+              <a:rPr lang="en-US" dirty="0" smtClean="0"/>
+              <a:t>3,500 </a:t>
+            </a:r>
+            <a:r>
+              <a:rPr lang="en-US" dirty="0" smtClean="0"/>
+              <a:t>million generic (tau-pair) MC events produced by the Belle II Collaboration</a:t>
+            </a:r>
           </a:p>
           <a:p>
             <a:r>
@@ -7060,14 +7725,27 @@
               <a:rPr lang="en-US" dirty="0" smtClean="0"/>
               <a:t>backgrounds</a:t>
             </a:r>
-          </a:p>
-          <a:p>
-            <a:endParaRPr lang="en-US" dirty="0"/>
-          </a:p>
-          <a:p>
-            <a:r>
-              <a:rPr lang="en-US" dirty="0" smtClean="0"/>
-              <a:t>analysis performed in </a:t>
+            <a:endParaRPr lang="en-US" dirty="0" smtClean="0"/>
+          </a:p>
+          <a:p>
+            <a:endParaRPr lang="en-US" dirty="0"/>
+          </a:p>
+          <a:p>
+            <a:r>
+              <a:rPr lang="en-US" dirty="0" smtClean="0"/>
+              <a:t>productio</a:t>
+            </a:r>
+            <a:r>
+              <a:rPr lang="en-US" dirty="0" smtClean="0"/>
+              <a:t>n and </a:t>
+            </a:r>
+            <a:r>
+              <a:rPr lang="en-US" dirty="0" smtClean="0"/>
+              <a:t>analysis being performed </a:t>
+            </a:r>
+            <a:r>
+              <a:rPr lang="en-US" dirty="0" smtClean="0"/>
+              <a:t>in </a:t>
             </a:r>
             <a:r>
               <a:rPr lang="en-US" dirty="0" smtClean="0">
@@ -7092,8 +7770,17 @@
               <a:rPr lang="en-US" sz="2200" dirty="0" smtClean="0">
                 <a:cs typeface="Courier New"/>
               </a:rPr>
-              <a:t>analysis should be ready for Belle II first data!</a:t>
-            </a:r>
+              <a:t>analysis should be ready for Belle II first </a:t>
+            </a:r>
+            <a:r>
+              <a:rPr lang="en-US" sz="2200" dirty="0" smtClean="0">
+                <a:cs typeface="Courier New"/>
+              </a:rPr>
+              <a:t>data</a:t>
+            </a:r>
+            <a:endParaRPr lang="en-US" sz="2200" dirty="0" smtClean="0">
+              <a:cs typeface="Courier New"/>
+            </a:endParaRPr>
           </a:p>
           <a:p>
             <a:pPr lvl="1"/>
@@ -7134,7 +7821,7 @@
             <a:fld id="{BA9B540C-44DA-4F69-89C9-7C84606640D3}" type="slidenum">
               <a:rPr lang="en-US" smtClean="0"/>
               <a:pPr/>
-              <a:t>14</a:t>
+              <a:t>13</a:t>
             </a:fld>
             <a:endParaRPr lang="en-US" dirty="0"/>
           </a:p>
@@ -7160,7 +7847,7 @@
 </p:sld>
 </file>
 
-<file path=ppt/slides/slide15.xml><?xml version="1.0" encoding="utf-8"?>
+<file path=ppt/slides/slide14.xml><?xml version="1.0" encoding="utf-8"?>
 <p:sld xmlns:a="http://schemas.openxmlformats.org/drawingml/2006/main" xmlns:r="http://schemas.openxmlformats.org/officeDocument/2006/relationships" xmlns:p="http://schemas.openxmlformats.org/presentationml/2006/main">
   <p:cSld>
     <p:spTree>
@@ -7218,7 +7905,7 @@
             <a:fld id="{BA9B540C-44DA-4F69-89C9-7C84606640D3}" type="slidenum">
               <a:rPr lang="en-US" smtClean="0"/>
               <a:pPr/>
-              <a:t>15</a:t>
+              <a:t>14</a:t>
             </a:fld>
             <a:endParaRPr lang="en-US" dirty="0"/>
           </a:p>
@@ -7574,7 +8261,7 @@
           <a:graphicData uri="http://schemas.openxmlformats.org/presentationml/2006/ole">
             <mc:AlternateContent xmlns:mc="http://schemas.openxmlformats.org/markup-compatibility/2006">
               <mc:Choice xmlns:v="urn:schemas-microsoft-com:vml" Requires="v">
-                <p:oleObj spid="_x0000_s3450" name="Equation" r:id="rId6" imgW="1193800" imgH="203200" progId="Equation.3">
+                <p:oleObj spid="_x0000_s3745" name="Equation" r:id="rId6" imgW="1193800" imgH="203200" progId="Equation.3">
                   <p:embed/>
                 </p:oleObj>
               </mc:Choice>
@@ -7631,7 +8318,7 @@
           <a:graphicData uri="http://schemas.openxmlformats.org/presentationml/2006/ole">
             <mc:AlternateContent xmlns:mc="http://schemas.openxmlformats.org/markup-compatibility/2006">
               <mc:Choice xmlns:v="urn:schemas-microsoft-com:vml" Requires="v">
-                <p:oleObj spid="_x0000_s3451" name="Equation" r:id="rId8" imgW="1333500" imgH="241300" progId="Equation.3">
+                <p:oleObj spid="_x0000_s3746" name="Equation" r:id="rId8" imgW="1333500" imgH="241300" progId="Equation.3">
                   <p:embed/>
                 </p:oleObj>
               </mc:Choice>
@@ -7686,7 +8373,7 @@
 </p:sld>
 </file>
 
-<file path=ppt/slides/slide16.xml><?xml version="1.0" encoding="utf-8"?>
+<file path=ppt/slides/slide15.xml><?xml version="1.0" encoding="utf-8"?>
 <p:sld xmlns:a="http://schemas.openxmlformats.org/drawingml/2006/main" xmlns:r="http://schemas.openxmlformats.org/officeDocument/2006/relationships" xmlns:p="http://schemas.openxmlformats.org/presentationml/2006/main">
   <p:cSld>
     <p:spTree>
@@ -7823,7 +8510,7 @@
             <a:fld id="{BA9B540C-44DA-4F69-89C9-7C84606640D3}" type="slidenum">
               <a:rPr lang="en-US" smtClean="0"/>
               <a:pPr/>
-              <a:t>16</a:t>
+              <a:t>15</a:t>
             </a:fld>
             <a:endParaRPr lang="en-US" dirty="0"/>
           </a:p>
@@ -8015,7 +8702,7 @@
           <a:graphicData uri="http://schemas.openxmlformats.org/presentationml/2006/ole">
             <mc:AlternateContent xmlns:mc="http://schemas.openxmlformats.org/markup-compatibility/2006">
               <mc:Choice xmlns:v="urn:schemas-microsoft-com:vml" Requires="v">
-                <p:oleObj spid="_x0000_s7266" name="Equation" r:id="rId4" imgW="1346200" imgH="266700" progId="Equation.3">
+                <p:oleObj spid="_x0000_s7414" name="Equation" r:id="rId4" imgW="1346200" imgH="266700" progId="Equation.3">
                   <p:embed/>
                 </p:oleObj>
               </mc:Choice>
@@ -8281,7 +8968,6 @@
               <a:rPr lang="en-US" dirty="0" smtClean="0"/>
               <a:t>decays most sensitive</a:t>
             </a:r>
-            <a:endParaRPr lang="en-US" dirty="0" smtClean="0"/>
           </a:p>
           <a:p>
             <a:r>
@@ -8301,11 +8987,7 @@
             <a:pPr lvl="1"/>
             <a:r>
               <a:rPr lang="en-US" dirty="0" smtClean="0"/>
-              <a:t>expected limit on </a:t>
-            </a:r>
-            <a:r>
-              <a:rPr lang="en-US" dirty="0" smtClean="0"/>
-              <a:t>branching fraction               greater than μ</a:t>
+              <a:t>expected limit on branching fraction               greater than μ</a:t>
             </a:r>
             <a:r>
               <a:rPr lang="en-US" dirty="0" smtClean="0">
@@ -8350,11 +9032,7 @@
             </a:r>
             <a:r>
               <a:rPr lang="en-US" dirty="0" smtClean="0"/>
-              <a:t> due to tau </a:t>
-            </a:r>
-            <a:r>
-              <a:rPr lang="en-US" dirty="0" smtClean="0"/>
-              <a:t>mass</a:t>
+              <a:t> due to tau mass</a:t>
             </a:r>
           </a:p>
           <a:p>
@@ -8429,7 +9107,7 @@
           <a:graphicData uri="http://schemas.openxmlformats.org/presentationml/2006/ole">
             <mc:AlternateContent xmlns:mc="http://schemas.openxmlformats.org/markup-compatibility/2006">
               <mc:Choice xmlns:v="urn:schemas-microsoft-com:vml" Requires="v">
-                <p:oleObj spid="_x0000_s6272" name="Equation" r:id="rId4" imgW="469900" imgH="215900" progId="Equation.3">
+                <p:oleObj spid="_x0000_s6420" name="Equation" r:id="rId4" imgW="469900" imgH="215900" progId="Equation.3">
                   <p:embed/>
                 </p:oleObj>
               </mc:Choice>
@@ -8758,10 +9436,10 @@
           <a:lstStyle/>
           <a:p>
             <a:r>
-              <a:rPr lang="en-US" sz="4800" dirty="0" smtClean="0"/>
-              <a:t>Motivations for LFV searches</a:t>
-            </a:r>
-            <a:endParaRPr lang="en-US" sz="4800" dirty="0"/>
+              <a:rPr lang="en-US" dirty="0" smtClean="0"/>
+              <a:t>Neutrino mixing</a:t>
+            </a:r>
+            <a:endParaRPr lang="en-US" dirty="0"/>
           </a:p>
         </p:txBody>
       </p:sp>
@@ -8775,21 +9453,68 @@
             <p:ph idx="1"/>
           </p:nvPr>
         </p:nvSpPr>
-        <p:spPr/>
+        <p:spPr>
+          <a:xfrm>
+            <a:off x="387930" y="1600200"/>
+            <a:ext cx="3791525" cy="4800600"/>
+          </a:xfrm>
+        </p:spPr>
         <p:txBody>
           <a:bodyPr/>
           <a:lstStyle/>
           <a:p>
-            <a:endParaRPr lang="en-US" dirty="0"/>
-          </a:p>
-          <a:p>
-            <a:endParaRPr lang="en-US" dirty="0" smtClean="0"/>
-          </a:p>
-          <a:p>
-            <a:r>
-              <a:rPr lang="en-US" dirty="0" smtClean="0"/>
-              <a:t>Okay I need more here</a:t>
-            </a:r>
+            <a:r>
+              <a:rPr lang="en-US" sz="2000" dirty="0"/>
+              <a:t>lepton sector not fully </a:t>
+            </a:r>
+            <a:r>
+              <a:rPr lang="en-US" sz="2000" dirty="0" smtClean="0"/>
+              <a:t>understood (see: neutrino masses)</a:t>
+            </a:r>
+          </a:p>
+          <a:p>
+            <a:endParaRPr lang="en-US" sz="2000" dirty="0" smtClean="0"/>
+          </a:p>
+          <a:p>
+            <a:r>
+              <a:rPr lang="en-US" sz="2000" dirty="0" smtClean="0"/>
+              <a:t>many </a:t>
+            </a:r>
+            <a:r>
+              <a:rPr lang="en-US" sz="2000" dirty="0"/>
+              <a:t>mechanisms </a:t>
+            </a:r>
+            <a:r>
+              <a:rPr lang="en-US" sz="2000" dirty="0" smtClean="0"/>
+              <a:t>which</a:t>
+            </a:r>
+            <a:r>
+              <a:rPr lang="en-US" sz="2000" dirty="0" smtClean="0"/>
+              <a:t> </a:t>
+            </a:r>
+            <a:r>
+              <a:rPr lang="en-US" sz="2000" dirty="0"/>
+              <a:t>explain neutrino mixing </a:t>
+            </a:r>
+            <a:r>
+              <a:rPr lang="en-US" sz="2000" dirty="0" smtClean="0"/>
+              <a:t>introduce LFV!</a:t>
+            </a:r>
+          </a:p>
+          <a:p>
+            <a:endParaRPr lang="en-US" sz="2000" dirty="0" smtClean="0"/>
+          </a:p>
+          <a:p>
+            <a:r>
+              <a:rPr lang="en-US" sz="2000" dirty="0" smtClean="0"/>
+              <a:t>see-saw models, for example, introduce new scalars which could couple with leptons to produce LFV </a:t>
+            </a:r>
+            <a:endParaRPr lang="en-US" sz="2000" dirty="0" smtClean="0"/>
+          </a:p>
+          <a:p>
+            <a:endParaRPr lang="en-US" sz="2000" dirty="0" smtClean="0"/>
+          </a:p>
+          <a:p>
             <a:endParaRPr lang="en-US" dirty="0"/>
           </a:p>
         </p:txBody>
@@ -8818,10 +9543,129 @@
           </a:p>
         </p:txBody>
       </p:sp>
+      <p:pic>
+        <p:nvPicPr>
+          <p:cNvPr id="6" name="Picture 5" descr="seesaw types.png"/>
+          <p:cNvPicPr>
+            <a:picLocks noChangeAspect="1"/>
+          </p:cNvPicPr>
+          <p:nvPr/>
+        </p:nvPicPr>
+        <p:blipFill>
+          <a:blip r:embed="rId3">
+            <a:extLst>
+              <a:ext uri="{28A0092B-C50C-407E-A947-70E740481C1C}">
+                <a14:useLocalDpi xmlns:a14="http://schemas.microsoft.com/office/drawing/2010/main" val="0"/>
+              </a:ext>
+            </a:extLst>
+          </a:blip>
+          <a:stretch>
+            <a:fillRect/>
+          </a:stretch>
+        </p:blipFill>
+        <p:spPr>
+          <a:xfrm>
+            <a:off x="3682460" y="1339357"/>
+            <a:ext cx="4719854" cy="2680933"/>
+          </a:xfrm>
+          <a:prstGeom prst="rect">
+            <a:avLst/>
+          </a:prstGeom>
+        </p:spPr>
+      </p:pic>
+      <p:pic>
+        <p:nvPicPr>
+          <p:cNvPr id="7" name="Picture 6" descr="seesaw LFV.png"/>
+          <p:cNvPicPr>
+            <a:picLocks noChangeAspect="1"/>
+          </p:cNvPicPr>
+          <p:nvPr/>
+        </p:nvPicPr>
+        <p:blipFill rotWithShape="1">
+          <a:blip r:embed="rId4">
+            <a:extLst>
+              <a:ext uri="{28A0092B-C50C-407E-A947-70E740481C1C}">
+                <a14:useLocalDpi xmlns:a14="http://schemas.microsoft.com/office/drawing/2010/main" val="0"/>
+              </a:ext>
+            </a:extLst>
+          </a:blip>
+          <a:srcRect l="3510" t="7437" r="3514" b="7246"/>
+          <a:stretch/>
+        </p:blipFill>
+        <p:spPr>
+          <a:xfrm>
+            <a:off x="4490358" y="4635496"/>
+            <a:ext cx="3456214" cy="1324428"/>
+          </a:xfrm>
+          <a:prstGeom prst="rect">
+            <a:avLst/>
+          </a:prstGeom>
+        </p:spPr>
+      </p:pic>
+      <p:sp>
+        <p:nvSpPr>
+          <p:cNvPr id="8" name="TextBox 7"/>
+          <p:cNvSpPr txBox="1"/>
+          <p:nvPr/>
+        </p:nvSpPr>
+        <p:spPr>
+          <a:xfrm>
+            <a:off x="4117274" y="4050802"/>
+            <a:ext cx="3959926" cy="307777"/>
+          </a:xfrm>
+          <a:prstGeom prst="rect">
+            <a:avLst/>
+          </a:prstGeom>
+          <a:noFill/>
+        </p:spPr>
+        <p:txBody>
+          <a:bodyPr wrap="none" rtlCol="0">
+            <a:spAutoFit/>
+          </a:bodyPr>
+          <a:lstStyle/>
+          <a:p>
+            <a:r>
+              <a:rPr lang="en-US" sz="1400" dirty="0" smtClean="0"/>
+              <a:t>Figure: New particles introduced via seesaw models</a:t>
+            </a:r>
+            <a:endParaRPr lang="en-US" sz="1400" dirty="0"/>
+          </a:p>
+        </p:txBody>
+      </p:sp>
+      <p:sp>
+        <p:nvSpPr>
+          <p:cNvPr id="9" name="TextBox 8"/>
+          <p:cNvSpPr txBox="1"/>
+          <p:nvPr/>
+        </p:nvSpPr>
+        <p:spPr>
+          <a:xfrm>
+            <a:off x="4896099" y="6072413"/>
+            <a:ext cx="2276159" cy="307777"/>
+          </a:xfrm>
+          <a:prstGeom prst="rect">
+            <a:avLst/>
+          </a:prstGeom>
+          <a:noFill/>
+        </p:spPr>
+        <p:txBody>
+          <a:bodyPr wrap="none" rtlCol="0">
+            <a:spAutoFit/>
+          </a:bodyPr>
+          <a:lstStyle/>
+          <a:p>
+            <a:r>
+              <a:rPr lang="en-US" sz="1400" dirty="0" smtClean="0"/>
+              <a:t>Figure: LFV in Type-II seesaw </a:t>
+            </a:r>
+            <a:endParaRPr lang="en-US" sz="1400" dirty="0"/>
+          </a:p>
+        </p:txBody>
+      </p:sp>
     </p:spTree>
     <p:extLst>
       <p:ext uri="{BB962C8B-B14F-4D97-AF65-F5344CB8AC3E}">
-        <p14:creationId xmlns:p14="http://schemas.microsoft.com/office/powerpoint/2010/main" val="1278610600"/>
+        <p14:creationId xmlns:p14="http://schemas.microsoft.com/office/powerpoint/2010/main" val="3224497398"/>
       </p:ext>
     </p:extLst>
   </p:cSld>
@@ -8871,8 +9715,12 @@
           <a:lstStyle/>
           <a:p>
             <a:r>
-              <a:rPr lang="en-US" dirty="0" smtClean="0"/>
-              <a:t>Neutrino mixing</a:t>
+              <a:rPr lang="en-US" dirty="0"/>
+              <a:t>h → τ </a:t>
+            </a:r>
+            <a:r>
+              <a:rPr lang="en-US" dirty="0" smtClean="0"/>
+              <a:t>μ excess</a:t>
             </a:r>
             <a:endParaRPr lang="en-US" dirty="0"/>
           </a:p>
@@ -8894,18 +9742,59 @@
           <a:lstStyle/>
           <a:p>
             <a:r>
-              <a:rPr lang="en-US" dirty="0"/>
-              <a:t>many mechanisms to explain neutrino mixing necessarily introduce LFV (???)</a:t>
-            </a:r>
-          </a:p>
-          <a:p>
-            <a:endParaRPr lang="en-US" dirty="0"/>
-          </a:p>
-        </p:txBody>
-      </p:sp>
-      <p:sp>
-        <p:nvSpPr>
-          <p:cNvPr id="4" name="Slide Number Placeholder 3"/>
+              <a:rPr lang="en-US" dirty="0" smtClean="0"/>
+              <a:t>tau </a:t>
+            </a:r>
+            <a:r>
+              <a:rPr lang="en-US" dirty="0" smtClean="0"/>
+              <a:t>LFV is exciting for the Higgs sector</a:t>
+            </a:r>
+          </a:p>
+          <a:p>
+            <a:r>
+              <a:rPr lang="en-US" dirty="0" smtClean="0"/>
+              <a:t>CMS found some excess ???</a:t>
+            </a:r>
+          </a:p>
+          <a:p>
+            <a:r>
+              <a:rPr lang="en-US" dirty="0" smtClean="0"/>
+              <a:t>ATLAS found (not) an excess (?)</a:t>
+            </a:r>
+            <a:endParaRPr lang="en-US" i="1" dirty="0"/>
+          </a:p>
+          <a:p>
+            <a:r>
+              <a:rPr lang="en-US" i="1" dirty="0" smtClean="0"/>
+              <a:t>Aristizal Sierra </a:t>
+            </a:r>
+            <a:r>
+              <a:rPr lang="en-US" dirty="0" smtClean="0"/>
+              <a:t>and </a:t>
+            </a:r>
+            <a:r>
+              <a:rPr lang="en-US" i="1" dirty="0" smtClean="0"/>
+              <a:t>Vicente</a:t>
+            </a:r>
+            <a:r>
+              <a:rPr lang="en-US" dirty="0" smtClean="0"/>
+              <a:t> (2014) propose an explanation of observed excess</a:t>
+            </a:r>
+          </a:p>
+          <a:p>
+            <a:r>
+              <a:rPr lang="en-US" dirty="0" smtClean="0"/>
+              <a:t>Type-III 2HDM (two Higgs doublet model) allows LFV</a:t>
+            </a:r>
+          </a:p>
+          <a:p>
+            <a:endParaRPr lang="en-US" dirty="0"/>
+          </a:p>
+        </p:txBody>
+      </p:sp>
+      <p:sp>
+        <p:nvSpPr>
+          <p:cNvPr id="7" name="Slide Number Placeholder 6"/>
           <p:cNvSpPr>
             <a:spLocks noGrp="1"/>
           </p:cNvSpPr>
@@ -8930,7 +9819,7 @@
     </p:spTree>
     <p:extLst>
       <p:ext uri="{BB962C8B-B14F-4D97-AF65-F5344CB8AC3E}">
-        <p14:creationId xmlns:p14="http://schemas.microsoft.com/office/powerpoint/2010/main" val="3224497398"/>
+        <p14:creationId xmlns:p14="http://schemas.microsoft.com/office/powerpoint/2010/main" val="4214104916"/>
       </p:ext>
     </p:extLst>
   </p:cSld>
@@ -8993,73 +9882,7 @@
       </p:sp>
       <p:sp>
         <p:nvSpPr>
-          <p:cNvPr id="3" name="Content Placeholder 2"/>
-          <p:cNvSpPr>
-            <a:spLocks noGrp="1"/>
-          </p:cNvSpPr>
-          <p:nvPr>
-            <p:ph idx="1"/>
-          </p:nvPr>
-        </p:nvSpPr>
-        <p:spPr/>
-        <p:txBody>
-          <a:bodyPr/>
-          <a:lstStyle/>
-          <a:p>
-            <a:r>
-              <a:rPr lang="en-US" dirty="0" smtClean="0"/>
-              <a:t>Tau LFV is exciting for the Higgs sector</a:t>
-            </a:r>
-          </a:p>
-          <a:p>
-            <a:r>
-              <a:rPr lang="en-US" dirty="0" smtClean="0"/>
-              <a:t>CMS </a:t>
-            </a:r>
-            <a:r>
-              <a:rPr lang="en-US" dirty="0" smtClean="0"/>
-              <a:t>found some excess ???</a:t>
-            </a:r>
-          </a:p>
-          <a:p>
-            <a:r>
-              <a:rPr lang="en-US" dirty="0" smtClean="0"/>
-              <a:t>ATLAS found (not) an excess (?)</a:t>
-            </a:r>
-            <a:endParaRPr lang="en-US" i="1" dirty="0"/>
-          </a:p>
-          <a:p>
-            <a:r>
-              <a:rPr lang="en-US" i="1" dirty="0" smtClean="0"/>
-              <a:t>Aristizal Sierra </a:t>
-            </a:r>
-            <a:r>
-              <a:rPr lang="en-US" dirty="0" smtClean="0"/>
-              <a:t>and </a:t>
-            </a:r>
-            <a:r>
-              <a:rPr lang="en-US" i="1" dirty="0" smtClean="0"/>
-              <a:t>Vicente</a:t>
-            </a:r>
-            <a:r>
-              <a:rPr lang="en-US" dirty="0" smtClean="0"/>
-              <a:t> (2014) propose an explanation of observed excess</a:t>
-            </a:r>
-          </a:p>
-          <a:p>
-            <a:r>
-              <a:rPr lang="en-US" dirty="0" smtClean="0"/>
-              <a:t>Type-III 2HDM (two Higgs doublet model) allows LFV</a:t>
-            </a:r>
-          </a:p>
-          <a:p>
-            <a:endParaRPr lang="en-US" dirty="0"/>
-          </a:p>
-        </p:txBody>
-      </p:sp>
-      <p:sp>
-        <p:nvSpPr>
-          <p:cNvPr id="7" name="Slide Number Placeholder 6"/>
+          <p:cNvPr id="9" name="Slide Number Placeholder 8"/>
           <p:cNvSpPr>
             <a:spLocks noGrp="1"/>
           </p:cNvSpPr>
@@ -9081,94 +9904,6 @@
           </a:p>
         </p:txBody>
       </p:sp>
-    </p:spTree>
-    <p:extLst>
-      <p:ext uri="{BB962C8B-B14F-4D97-AF65-F5344CB8AC3E}">
-        <p14:creationId xmlns:p14="http://schemas.microsoft.com/office/powerpoint/2010/main" val="4214104916"/>
-      </p:ext>
-    </p:extLst>
-  </p:cSld>
-  <p:clrMapOvr>
-    <a:masterClrMapping/>
-  </p:clrMapOvr>
-  <p:timing>
-    <p:tnLst>
-      <p:par>
-        <p:cTn xmlns:p14="http://schemas.microsoft.com/office/powerpoint/2010/main" id="1" dur="indefinite" restart="never" nodeType="tmRoot"/>
-      </p:par>
-    </p:tnLst>
-  </p:timing>
-</p:sld>
-</file>
-
-<file path=ppt/slides/slide8.xml><?xml version="1.0" encoding="utf-8"?>
-<p:sld xmlns:a="http://schemas.openxmlformats.org/drawingml/2006/main" xmlns:r="http://schemas.openxmlformats.org/officeDocument/2006/relationships" xmlns:p="http://schemas.openxmlformats.org/presentationml/2006/main">
-  <p:cSld>
-    <p:spTree>
-      <p:nvGrpSpPr>
-        <p:cNvPr id="1" name=""/>
-        <p:cNvGrpSpPr/>
-        <p:nvPr/>
-      </p:nvGrpSpPr>
-      <p:grpSpPr>
-        <a:xfrm>
-          <a:off x="0" y="0"/>
-          <a:ext cx="0" cy="0"/>
-          <a:chOff x="0" y="0"/>
-          <a:chExt cx="0" cy="0"/>
-        </a:xfrm>
-      </p:grpSpPr>
-      <p:sp>
-        <p:nvSpPr>
-          <p:cNvPr id="2" name="Title 1"/>
-          <p:cNvSpPr>
-            <a:spLocks noGrp="1"/>
-          </p:cNvSpPr>
-          <p:nvPr>
-            <p:ph type="title"/>
-          </p:nvPr>
-        </p:nvSpPr>
-        <p:spPr/>
-        <p:txBody>
-          <a:bodyPr/>
-          <a:lstStyle/>
-          <a:p>
-            <a:r>
-              <a:rPr lang="en-US" dirty="0"/>
-              <a:t>h → τ </a:t>
-            </a:r>
-            <a:r>
-              <a:rPr lang="en-US" dirty="0" smtClean="0"/>
-              <a:t>μ excess</a:t>
-            </a:r>
-            <a:endParaRPr lang="en-US" dirty="0"/>
-          </a:p>
-        </p:txBody>
-      </p:sp>
-      <p:sp>
-        <p:nvSpPr>
-          <p:cNvPr id="9" name="Slide Number Placeholder 8"/>
-          <p:cNvSpPr>
-            <a:spLocks noGrp="1"/>
-          </p:cNvSpPr>
-          <p:nvPr>
-            <p:ph type="sldNum" sz="quarter" idx="12"/>
-          </p:nvPr>
-        </p:nvSpPr>
-        <p:spPr/>
-        <p:txBody>
-          <a:bodyPr/>
-          <a:lstStyle/>
-          <a:p>
-            <a:fld id="{BA9B540C-44DA-4F69-89C9-7C84606640D3}" type="slidenum">
-              <a:rPr lang="en-US" smtClean="0"/>
-              <a:pPr/>
-              <a:t>8</a:t>
-            </a:fld>
-            <a:endParaRPr lang="en-US" dirty="0"/>
-          </a:p>
-        </p:txBody>
-      </p:sp>
       <p:sp>
         <p:nvSpPr>
           <p:cNvPr id="8" name="TextBox 7"/>
@@ -9177,8 +9912,8 @@
         </p:nvSpPr>
         <p:spPr>
           <a:xfrm>
-            <a:off x="265188" y="5578822"/>
-            <a:ext cx="4950104" cy="584776"/>
+            <a:off x="334458" y="5578822"/>
+            <a:ext cx="4606994" cy="584776"/>
           </a:xfrm>
           <a:prstGeom prst="rect">
             <a:avLst/>
@@ -9194,7 +9929,15 @@
             <a:pPr algn="ctr"/>
             <a:r>
               <a:rPr lang="en-US" sz="1600" dirty="0" smtClean="0"/>
-              <a:t>Figure: BR(h </a:t>
+              <a:t>Figure: </a:t>
+            </a:r>
+            <a:r>
+              <a:rPr lang="en-US" sz="1600" dirty="0" smtClean="0"/>
+              <a:t>B(</a:t>
+            </a:r>
+            <a:r>
+              <a:rPr lang="en-US" sz="1600" dirty="0" smtClean="0"/>
+              <a:t>h </a:t>
             </a:r>
             <a:r>
               <a:rPr lang="en-US" sz="1600" dirty="0" smtClean="0">
@@ -9204,7 +9947,11 @@
             </a:r>
             <a:r>
               <a:rPr lang="en-US" sz="1600" dirty="0" smtClean="0"/>
-              <a:t> τ μ) as a function of BR(</a:t>
+              <a:t> τ μ) </a:t>
+            </a:r>
+            <a:r>
+              <a:rPr lang="en-US" sz="1600" dirty="0" smtClean="0"/>
+              <a:t>against B(</a:t>
             </a:r>
             <a:r>
               <a:rPr lang="en-US" sz="1600" dirty="0"/>
@@ -9222,14 +9969,35 @@
             </a:r>
             <a:r>
               <a:rPr lang="en-US" sz="1600" dirty="0" smtClean="0"/>
-              <a:t>γ) </a:t>
-            </a:r>
-          </a:p>
-          <a:p>
-            <a:pPr algn="ctr"/>
+              <a:t>γ</a:t>
+            </a:r>
             <a:r>
               <a:rPr lang="en-US" sz="1600" dirty="0" smtClean="0"/>
-              <a:t>(Aristizabal Sierra and Vicente, 2014)</a:t>
+              <a:t>), with various ranges predicted by NP models</a:t>
+            </a:r>
+            <a:r>
+              <a:rPr lang="en-US" sz="1600" dirty="0" smtClean="0"/>
+              <a:t> </a:t>
+            </a:r>
+            <a:r>
+              <a:rPr lang="en-US" sz="1600" dirty="0" smtClean="0"/>
+              <a:t>(</a:t>
+            </a:r>
+            <a:r>
+              <a:rPr lang="en-US" sz="1600" i="1" dirty="0" err="1" smtClean="0"/>
+              <a:t>Dorsner</a:t>
+            </a:r>
+            <a:r>
+              <a:rPr lang="en-US" sz="1600" i="1" dirty="0" smtClean="0"/>
+              <a:t> et </a:t>
+            </a:r>
+            <a:r>
+              <a:rPr lang="en-US" sz="1600" i="1" dirty="0" smtClean="0"/>
+              <a:t>al.</a:t>
+            </a:r>
+            <a:r>
+              <a:rPr lang="en-US" sz="1600" dirty="0" smtClean="0"/>
+              <a:t>, 2015)</a:t>
             </a:r>
             <a:endParaRPr lang="en-US" sz="1600" dirty="0"/>
           </a:p>
@@ -9243,8 +10011,8 @@
         </p:nvSpPr>
         <p:spPr>
           <a:xfrm>
-            <a:off x="4875128" y="1753809"/>
-            <a:ext cx="3499425" cy="3139321"/>
+            <a:off x="4700504" y="1753809"/>
+            <a:ext cx="3674049" cy="3139321"/>
           </a:xfrm>
           <a:prstGeom prst="rect">
             <a:avLst/>
@@ -9263,7 +10031,15 @@
             </a:pPr>
             <a:r>
               <a:rPr lang="en-US" dirty="0" smtClean="0"/>
-              <a:t>horizontal lines are 1σ bands on </a:t>
+              <a:t>horizontal lines are </a:t>
+            </a:r>
+            <a:r>
+              <a:rPr lang="en-US" dirty="0" smtClean="0"/>
+              <a:t>CMS 1σ </a:t>
+            </a:r>
+            <a:r>
+              <a:rPr lang="en-US" dirty="0" smtClean="0"/>
+              <a:t>bands on </a:t>
             </a:r>
             <a:r>
               <a:rPr lang="en-US" dirty="0"/>
@@ -9333,11 +10109,7 @@
             </a:pPr>
             <a:r>
               <a:rPr lang="en-US" dirty="0" smtClean="0"/>
-              <a:t>under this model we would expect to find a signature in Belle </a:t>
-            </a:r>
-            <a:r>
-              <a:rPr lang="en-US" dirty="0" smtClean="0"/>
-              <a:t>II (!!)</a:t>
+              <a:t>under this model we would expect to find a signature in Belle II (!!)</a:t>
             </a:r>
             <a:endParaRPr lang="en-US" dirty="0"/>
           </a:p>
@@ -9400,7 +10172,7 @@
 </p:sld>
 </file>
 
-<file path=ppt/slides/slide9.xml><?xml version="1.0" encoding="utf-8"?>
+<file path=ppt/slides/slide8.xml><?xml version="1.0" encoding="utf-8"?>
 <p:sld xmlns:a="http://schemas.openxmlformats.org/drawingml/2006/main" xmlns:r="http://schemas.openxmlformats.org/officeDocument/2006/relationships" xmlns:p="http://schemas.openxmlformats.org/presentationml/2006/main">
   <p:cSld>
     <p:spTree>
@@ -9510,7 +10282,7 @@
             <a:fld id="{BA9B540C-44DA-4F69-89C9-7C84606640D3}" type="slidenum">
               <a:rPr lang="en-US" smtClean="0"/>
               <a:pPr/>
-              <a:t>9</a:t>
+              <a:t>8</a:t>
             </a:fld>
             <a:endParaRPr lang="en-US" dirty="0"/>
           </a:p>
@@ -9541,15 +10313,7 @@
             <a:pPr algn="ctr"/>
             <a:r>
               <a:rPr lang="en-US" sz="1600" dirty="0" smtClean="0"/>
-              <a:t>Table 2: </a:t>
-            </a:r>
-            <a:r>
-              <a:rPr lang="en-US" sz="1600" dirty="0" smtClean="0"/>
-              <a:t>Upper limits of branching </a:t>
-            </a:r>
-            <a:r>
-              <a:rPr lang="en-US" sz="1600" dirty="0" smtClean="0"/>
-              <a:t>fractions of </a:t>
+              <a:t>Table 2: Upper limits of branching fractions of </a:t>
             </a:r>
             <a:r>
               <a:rPr lang="en-US" sz="1600" dirty="0"/>
@@ -9789,6 +10553,704 @@
     <p:extLst>
       <p:ext uri="{BB962C8B-B14F-4D97-AF65-F5344CB8AC3E}">
         <p14:creationId xmlns:p14="http://schemas.microsoft.com/office/powerpoint/2010/main" val="2556218789"/>
+      </p:ext>
+    </p:extLst>
+  </p:cSld>
+  <p:clrMapOvr>
+    <a:masterClrMapping/>
+  </p:clrMapOvr>
+  <p:timing>
+    <p:tnLst>
+      <p:par>
+        <p:cTn xmlns:p14="http://schemas.microsoft.com/office/powerpoint/2010/main" id="1" dur="indefinite" restart="never" nodeType="tmRoot"/>
+      </p:par>
+    </p:tnLst>
+  </p:timing>
+</p:sld>
+</file>
+
+<file path=ppt/slides/slide9.xml><?xml version="1.0" encoding="utf-8"?>
+<p:sld xmlns:a="http://schemas.openxmlformats.org/drawingml/2006/main" xmlns:r="http://schemas.openxmlformats.org/officeDocument/2006/relationships" xmlns:p="http://schemas.openxmlformats.org/presentationml/2006/main">
+  <p:cSld>
+    <p:spTree>
+      <p:nvGrpSpPr>
+        <p:cNvPr id="1" name=""/>
+        <p:cNvGrpSpPr/>
+        <p:nvPr/>
+      </p:nvGrpSpPr>
+      <p:grpSpPr>
+        <a:xfrm>
+          <a:off x="0" y="0"/>
+          <a:ext cx="0" cy="0"/>
+          <a:chOff x="0" y="0"/>
+          <a:chExt cx="0" cy="0"/>
+        </a:xfrm>
+      </p:grpSpPr>
+      <p:sp>
+        <p:nvSpPr>
+          <p:cNvPr id="2" name="Title 1"/>
+          <p:cNvSpPr>
+            <a:spLocks noGrp="1"/>
+          </p:cNvSpPr>
+          <p:nvPr>
+            <p:ph type="title"/>
+          </p:nvPr>
+        </p:nvSpPr>
+        <p:spPr/>
+        <p:txBody>
+          <a:bodyPr/>
+          <a:lstStyle/>
+          <a:p>
+            <a:r>
+              <a:rPr lang="en-US" dirty="0" smtClean="0"/>
+              <a:t>Key backgrounds</a:t>
+            </a:r>
+            <a:endParaRPr lang="en-US" dirty="0"/>
+          </a:p>
+        </p:txBody>
+      </p:sp>
+      <p:sp>
+        <p:nvSpPr>
+          <p:cNvPr id="4" name="Slide Number Placeholder 3"/>
+          <p:cNvSpPr>
+            <a:spLocks noGrp="1"/>
+          </p:cNvSpPr>
+          <p:nvPr>
+            <p:ph type="sldNum" sz="quarter" idx="12"/>
+          </p:nvPr>
+        </p:nvSpPr>
+        <p:spPr/>
+        <p:txBody>
+          <a:bodyPr/>
+          <a:lstStyle/>
+          <a:p>
+            <a:fld id="{BA9B540C-44DA-4F69-89C9-7C84606640D3}" type="slidenum">
+              <a:rPr lang="en-US" smtClean="0"/>
+              <a:pPr/>
+              <a:t>9</a:t>
+            </a:fld>
+            <a:endParaRPr lang="en-US" dirty="0"/>
+          </a:p>
+        </p:txBody>
+      </p:sp>
+      <p:pic>
+        <p:nvPicPr>
+          <p:cNvPr id="6" name="Picture 5" descr="ee to mu mu gamma.png"/>
+          <p:cNvPicPr>
+            <a:picLocks noChangeAspect="1"/>
+          </p:cNvPicPr>
+          <p:nvPr/>
+        </p:nvPicPr>
+        <p:blipFill>
+          <a:blip r:embed="rId3">
+            <a:extLst>
+              <a:ext uri="{28A0092B-C50C-407E-A947-70E740481C1C}">
+                <a14:useLocalDpi xmlns:a14="http://schemas.microsoft.com/office/drawing/2010/main" val="0"/>
+              </a:ext>
+            </a:extLst>
+          </a:blip>
+          <a:stretch>
+            <a:fillRect/>
+          </a:stretch>
+        </p:blipFill>
+        <p:spPr>
+          <a:xfrm>
+            <a:off x="2902957" y="4153152"/>
+            <a:ext cx="3162537" cy="2025733"/>
+          </a:xfrm>
+          <a:prstGeom prst="rect">
+            <a:avLst/>
+          </a:prstGeom>
+        </p:spPr>
+      </p:pic>
+      <p:sp>
+        <p:nvSpPr>
+          <p:cNvPr id="10" name="TextBox 9"/>
+          <p:cNvSpPr txBox="1"/>
+          <p:nvPr/>
+        </p:nvSpPr>
+        <p:spPr>
+          <a:xfrm>
+            <a:off x="2983406" y="6208299"/>
+            <a:ext cx="2745463" cy="369332"/>
+          </a:xfrm>
+          <a:prstGeom prst="rect">
+            <a:avLst/>
+          </a:prstGeom>
+          <a:noFill/>
+        </p:spPr>
+        <p:txBody>
+          <a:bodyPr wrap="none" rtlCol="0">
+            <a:spAutoFit/>
+          </a:bodyPr>
+          <a:lstStyle/>
+          <a:p>
+            <a:r>
+              <a:rPr lang="en-US" dirty="0" smtClean="0"/>
+              <a:t>Figure: </a:t>
+            </a:r>
+            <a:r>
+              <a:rPr lang="en-US" dirty="0" smtClean="0">
+                <a:solidFill>
+                  <a:prstClr val="black"/>
+                </a:solidFill>
+              </a:rPr>
+              <a:t>e e </a:t>
+            </a:r>
+            <a:r>
+              <a:rPr lang="en-US" dirty="0" smtClean="0">
+                <a:solidFill>
+                  <a:prstClr val="black"/>
+                </a:solidFill>
+                <a:latin typeface="Cambria"/>
+              </a:rPr>
+              <a:t>→</a:t>
+            </a:r>
+            <a:r>
+              <a:rPr lang="en-US" dirty="0" smtClean="0">
+                <a:solidFill>
+                  <a:prstClr val="black"/>
+                </a:solidFill>
+              </a:rPr>
+              <a:t> μ μ γ</a:t>
+            </a:r>
+            <a:r>
+              <a:rPr lang="en-US" dirty="0" smtClean="0"/>
+              <a:t> diagram</a:t>
+            </a:r>
+            <a:endParaRPr lang="en-US" dirty="0"/>
+          </a:p>
+        </p:txBody>
+      </p:sp>
+      <p:grpSp>
+        <p:nvGrpSpPr>
+          <p:cNvPr id="19" name="Group 18"/>
+          <p:cNvGrpSpPr/>
+          <p:nvPr/>
+        </p:nvGrpSpPr>
+        <p:grpSpPr>
+          <a:xfrm>
+            <a:off x="560462" y="4917152"/>
+            <a:ext cx="2862177" cy="352165"/>
+            <a:chOff x="4890600" y="1165322"/>
+            <a:chExt cx="2862177" cy="352165"/>
+          </a:xfrm>
+        </p:grpSpPr>
+        <p:pic>
+          <p:nvPicPr>
+            <p:cNvPr id="5" name="Picture 4" descr="ee to mu mu gamma CS.png"/>
+            <p:cNvPicPr>
+              <a:picLocks noChangeAspect="1"/>
+            </p:cNvPicPr>
+            <p:nvPr/>
+          </p:nvPicPr>
+          <p:blipFill>
+            <a:blip r:embed="rId4">
+              <a:extLst>
+                <a:ext uri="{28A0092B-C50C-407E-A947-70E740481C1C}">
+                  <a14:useLocalDpi xmlns:a14="http://schemas.microsoft.com/office/drawing/2010/main" val="0"/>
+                </a:ext>
+              </a:extLst>
+            </a:blip>
+            <a:stretch>
+              <a:fillRect/>
+            </a:stretch>
+          </p:blipFill>
+          <p:spPr>
+            <a:xfrm>
+              <a:off x="4917336" y="1205817"/>
+              <a:ext cx="2835441" cy="311670"/>
+            </a:xfrm>
+            <a:prstGeom prst="rect">
+              <a:avLst/>
+            </a:prstGeom>
+          </p:spPr>
+        </p:pic>
+        <p:sp>
+          <p:nvSpPr>
+            <p:cNvPr id="15" name="Rectangle 14"/>
+            <p:cNvSpPr/>
+            <p:nvPr/>
+          </p:nvSpPr>
+          <p:spPr>
+            <a:xfrm>
+              <a:off x="4890600" y="1165322"/>
+              <a:ext cx="2862177" cy="352165"/>
+            </a:xfrm>
+            <a:prstGeom prst="rect">
+              <a:avLst/>
+            </a:prstGeom>
+            <a:noFill/>
+            <a:ln>
+              <a:solidFill>
+                <a:srgbClr val="FF0000"/>
+              </a:solidFill>
+            </a:ln>
+            <a:effectLst/>
+          </p:spPr>
+          <p:style>
+            <a:lnRef idx="1">
+              <a:schemeClr val="accent1"/>
+            </a:lnRef>
+            <a:fillRef idx="3">
+              <a:schemeClr val="accent1"/>
+            </a:fillRef>
+            <a:effectRef idx="2">
+              <a:schemeClr val="accent1"/>
+            </a:effectRef>
+            <a:fontRef idx="minor">
+              <a:schemeClr val="lt1"/>
+            </a:fontRef>
+          </p:style>
+          <p:txBody>
+            <a:bodyPr rtlCol="0" anchor="ctr"/>
+            <a:lstStyle/>
+            <a:p>
+              <a:pPr algn="ctr"/>
+              <a:endParaRPr lang="en-US" dirty="0"/>
+            </a:p>
+          </p:txBody>
+        </p:sp>
+      </p:grpSp>
+      <p:grpSp>
+        <p:nvGrpSpPr>
+          <p:cNvPr id="21" name="Group 20"/>
+          <p:cNvGrpSpPr/>
+          <p:nvPr/>
+        </p:nvGrpSpPr>
+        <p:grpSpPr>
+          <a:xfrm>
+            <a:off x="631071" y="1319852"/>
+            <a:ext cx="3460479" cy="2753092"/>
+            <a:chOff x="4576616" y="1324644"/>
+            <a:chExt cx="3460479" cy="2753092"/>
+          </a:xfrm>
+        </p:grpSpPr>
+        <p:pic>
+          <p:nvPicPr>
+            <p:cNvPr id="7" name="Picture 6" descr="tau to mu nu nu.png"/>
+            <p:cNvPicPr>
+              <a:picLocks noChangeAspect="1"/>
+            </p:cNvPicPr>
+            <p:nvPr/>
+          </p:nvPicPr>
+          <p:blipFill>
+            <a:blip r:embed="rId5">
+              <a:extLst>
+                <a:ext uri="{28A0092B-C50C-407E-A947-70E740481C1C}">
+                  <a14:useLocalDpi xmlns:a14="http://schemas.microsoft.com/office/drawing/2010/main" val="0"/>
+                </a:ext>
+              </a:extLst>
+            </a:blip>
+            <a:stretch>
+              <a:fillRect/>
+            </a:stretch>
+          </p:blipFill>
+          <p:spPr>
+            <a:xfrm>
+              <a:off x="4576616" y="1674474"/>
+              <a:ext cx="3460479" cy="1970780"/>
+            </a:xfrm>
+            <a:prstGeom prst="rect">
+              <a:avLst/>
+            </a:prstGeom>
+          </p:spPr>
+        </p:pic>
+        <p:sp>
+          <p:nvSpPr>
+            <p:cNvPr id="11" name="TextBox 10"/>
+            <p:cNvSpPr txBox="1"/>
+            <p:nvPr/>
+          </p:nvSpPr>
+          <p:spPr>
+            <a:xfrm>
+              <a:off x="4997825" y="3708404"/>
+              <a:ext cx="2529621" cy="369332"/>
+            </a:xfrm>
+            <a:prstGeom prst="rect">
+              <a:avLst/>
+            </a:prstGeom>
+            <a:noFill/>
+          </p:spPr>
+          <p:txBody>
+            <a:bodyPr wrap="none" rtlCol="0">
+              <a:spAutoFit/>
+            </a:bodyPr>
+            <a:lstStyle/>
+            <a:p>
+              <a:r>
+                <a:rPr lang="en-US" dirty="0" smtClean="0"/>
+                <a:t>Figure: </a:t>
+              </a:r>
+              <a:r>
+                <a:rPr lang="en-US" dirty="0" err="1" smtClean="0">
+                  <a:solidFill>
+                    <a:prstClr val="black"/>
+                  </a:solidFill>
+                </a:rPr>
+                <a:t>τ</a:t>
+              </a:r>
+              <a:r>
+                <a:rPr lang="en-US" dirty="0" smtClean="0">
+                  <a:solidFill>
+                    <a:prstClr val="black"/>
+                  </a:solidFill>
+                </a:rPr>
+                <a:t> </a:t>
+              </a:r>
+              <a:r>
+                <a:rPr lang="en-US" dirty="0" smtClean="0">
+                  <a:solidFill>
+                    <a:prstClr val="black"/>
+                  </a:solidFill>
+                  <a:latin typeface="Cambria"/>
+                </a:rPr>
+                <a:t>→</a:t>
+              </a:r>
+              <a:r>
+                <a:rPr lang="en-US" dirty="0" smtClean="0">
+                  <a:solidFill>
+                    <a:prstClr val="black"/>
+                  </a:solidFill>
+                </a:rPr>
+                <a:t> μ </a:t>
+              </a:r>
+              <a:r>
+                <a:rPr lang="en-US" dirty="0" err="1" smtClean="0">
+                  <a:solidFill>
+                    <a:prstClr val="black"/>
+                  </a:solidFill>
+                </a:rPr>
+                <a:t>ν</a:t>
+              </a:r>
+              <a:r>
+                <a:rPr lang="en-US" dirty="0" smtClean="0">
+                  <a:solidFill>
+                    <a:prstClr val="black"/>
+                  </a:solidFill>
+                </a:rPr>
+                <a:t> </a:t>
+              </a:r>
+              <a:r>
+                <a:rPr lang="en-US" dirty="0" err="1" smtClean="0">
+                  <a:solidFill>
+                    <a:prstClr val="black"/>
+                  </a:solidFill>
+                </a:rPr>
+                <a:t>ν</a:t>
+              </a:r>
+              <a:r>
+                <a:rPr lang="en-US" dirty="0" smtClean="0"/>
+                <a:t> diagram</a:t>
+              </a:r>
+              <a:endParaRPr lang="en-US" dirty="0"/>
+            </a:p>
+          </p:txBody>
+        </p:sp>
+        <p:grpSp>
+          <p:nvGrpSpPr>
+            <p:cNvPr id="18" name="Group 17"/>
+            <p:cNvGrpSpPr/>
+            <p:nvPr/>
+          </p:nvGrpSpPr>
+          <p:grpSpPr>
+            <a:xfrm>
+              <a:off x="4878228" y="1324644"/>
+              <a:ext cx="2374531" cy="470794"/>
+              <a:chOff x="939799" y="5414210"/>
+              <a:chExt cx="2777957" cy="550781"/>
+            </a:xfrm>
+          </p:grpSpPr>
+          <p:pic>
+            <p:nvPicPr>
+              <p:cNvPr id="13" name="Picture 12" descr="tau to mu nu nu BR.png"/>
+              <p:cNvPicPr>
+                <a:picLocks noChangeAspect="1"/>
+              </p:cNvPicPr>
+              <p:nvPr/>
+            </p:nvPicPr>
+            <p:blipFill rotWithShape="1">
+              <a:blip r:embed="rId6">
+                <a:extLst>
+                  <a:ext uri="{28A0092B-C50C-407E-A947-70E740481C1C}">
+                    <a14:useLocalDpi xmlns:a14="http://schemas.microsoft.com/office/drawing/2010/main" val="0"/>
+                  </a:ext>
+                </a:extLst>
+              </a:blip>
+              <a:srcRect t="19698" r="4447" b="25082"/>
+              <a:stretch/>
+            </p:blipFill>
+            <p:spPr>
+              <a:xfrm>
+                <a:off x="939799" y="5518313"/>
+                <a:ext cx="2751221" cy="341502"/>
+              </a:xfrm>
+              <a:prstGeom prst="rect">
+                <a:avLst/>
+              </a:prstGeom>
+            </p:spPr>
+          </p:pic>
+          <p:sp>
+            <p:nvSpPr>
+              <p:cNvPr id="16" name="Rectangle 15"/>
+              <p:cNvSpPr/>
+              <p:nvPr/>
+            </p:nvSpPr>
+            <p:spPr>
+              <a:xfrm>
+                <a:off x="966535" y="5414210"/>
+                <a:ext cx="2751221" cy="550781"/>
+              </a:xfrm>
+              <a:prstGeom prst="rect">
+                <a:avLst/>
+              </a:prstGeom>
+              <a:noFill/>
+              <a:ln>
+                <a:solidFill>
+                  <a:srgbClr val="FF0000"/>
+                </a:solidFill>
+              </a:ln>
+              <a:effectLst/>
+            </p:spPr>
+            <p:style>
+              <a:lnRef idx="1">
+                <a:schemeClr val="accent1"/>
+              </a:lnRef>
+              <a:fillRef idx="3">
+                <a:schemeClr val="accent1"/>
+              </a:fillRef>
+              <a:effectRef idx="2">
+                <a:schemeClr val="accent1"/>
+              </a:effectRef>
+              <a:fontRef idx="minor">
+                <a:schemeClr val="lt1"/>
+              </a:fontRef>
+            </p:style>
+            <p:txBody>
+              <a:bodyPr rtlCol="0" anchor="ctr"/>
+              <a:lstStyle/>
+              <a:p>
+                <a:pPr algn="ctr"/>
+                <a:endParaRPr lang="en-US" dirty="0"/>
+              </a:p>
+            </p:txBody>
+          </p:sp>
+        </p:grpSp>
+      </p:grpSp>
+      <p:grpSp>
+        <p:nvGrpSpPr>
+          <p:cNvPr id="20" name="Group 19"/>
+          <p:cNvGrpSpPr/>
+          <p:nvPr/>
+        </p:nvGrpSpPr>
+        <p:grpSpPr>
+          <a:xfrm>
+            <a:off x="4581401" y="1319852"/>
+            <a:ext cx="3631491" cy="2753092"/>
+            <a:chOff x="724647" y="1324644"/>
+            <a:chExt cx="3631491" cy="2753092"/>
+          </a:xfrm>
+        </p:grpSpPr>
+        <p:pic>
+          <p:nvPicPr>
+            <p:cNvPr id="8" name="Picture 7" descr="tau to pi nu.png"/>
+            <p:cNvPicPr>
+              <a:picLocks noChangeAspect="1"/>
+            </p:cNvPicPr>
+            <p:nvPr/>
+          </p:nvPicPr>
+          <p:blipFill>
+            <a:blip r:embed="rId7">
+              <a:extLst>
+                <a:ext uri="{28A0092B-C50C-407E-A947-70E740481C1C}">
+                  <a14:useLocalDpi xmlns:a14="http://schemas.microsoft.com/office/drawing/2010/main" val="0"/>
+                </a:ext>
+              </a:extLst>
+            </a:blip>
+            <a:stretch>
+              <a:fillRect/>
+            </a:stretch>
+          </p:blipFill>
+          <p:spPr>
+            <a:xfrm>
+              <a:off x="724647" y="1719636"/>
+              <a:ext cx="3631491" cy="1925618"/>
+            </a:xfrm>
+            <a:prstGeom prst="rect">
+              <a:avLst/>
+            </a:prstGeom>
+          </p:spPr>
+        </p:pic>
+        <p:sp>
+          <p:nvSpPr>
+            <p:cNvPr id="9" name="TextBox 8"/>
+            <p:cNvSpPr txBox="1"/>
+            <p:nvPr/>
+          </p:nvSpPr>
+          <p:spPr>
+            <a:xfrm>
+              <a:off x="1343225" y="3708404"/>
+              <a:ext cx="2374531" cy="369332"/>
+            </a:xfrm>
+            <a:prstGeom prst="rect">
+              <a:avLst/>
+            </a:prstGeom>
+            <a:noFill/>
+          </p:spPr>
+          <p:txBody>
+            <a:bodyPr wrap="none" rtlCol="0">
+              <a:spAutoFit/>
+            </a:bodyPr>
+            <a:lstStyle/>
+            <a:p>
+              <a:r>
+                <a:rPr lang="en-US" dirty="0" smtClean="0"/>
+                <a:t>Figure: </a:t>
+              </a:r>
+              <a:r>
+                <a:rPr lang="en-US" dirty="0" err="1" smtClean="0">
+                  <a:solidFill>
+                    <a:prstClr val="black"/>
+                  </a:solidFill>
+                </a:rPr>
+                <a:t>τ</a:t>
+              </a:r>
+              <a:r>
+                <a:rPr lang="en-US" dirty="0" smtClean="0">
+                  <a:solidFill>
+                    <a:prstClr val="black"/>
+                  </a:solidFill>
+                </a:rPr>
+                <a:t> </a:t>
+              </a:r>
+              <a:r>
+                <a:rPr lang="en-US" dirty="0" smtClean="0">
+                  <a:solidFill>
+                    <a:prstClr val="black"/>
+                  </a:solidFill>
+                  <a:latin typeface="Cambria"/>
+                </a:rPr>
+                <a:t>→</a:t>
+              </a:r>
+              <a:r>
+                <a:rPr lang="en-US" dirty="0" smtClean="0">
+                  <a:solidFill>
+                    <a:prstClr val="black"/>
+                  </a:solidFill>
+                </a:rPr>
+                <a:t> π </a:t>
+              </a:r>
+              <a:r>
+                <a:rPr lang="en-US" dirty="0" err="1" smtClean="0">
+                  <a:solidFill>
+                    <a:prstClr val="black"/>
+                  </a:solidFill>
+                </a:rPr>
+                <a:t>ν</a:t>
+              </a:r>
+              <a:r>
+                <a:rPr lang="en-US" dirty="0" smtClean="0"/>
+                <a:t> diagram</a:t>
+              </a:r>
+              <a:endParaRPr lang="en-US" dirty="0"/>
+            </a:p>
+          </p:txBody>
+        </p:sp>
+        <p:grpSp>
+          <p:nvGrpSpPr>
+            <p:cNvPr id="17" name="Group 16"/>
+            <p:cNvGrpSpPr/>
+            <p:nvPr/>
+          </p:nvGrpSpPr>
+          <p:grpSpPr>
+            <a:xfrm>
+              <a:off x="958987" y="1324644"/>
+              <a:ext cx="2418518" cy="503413"/>
+              <a:chOff x="323520" y="1417639"/>
+              <a:chExt cx="2579437" cy="504632"/>
+            </a:xfrm>
+          </p:grpSpPr>
+          <p:pic>
+            <p:nvPicPr>
+              <p:cNvPr id="12" name="Picture 11" descr="tau to pi nu BR.png"/>
+              <p:cNvPicPr>
+                <a:picLocks noChangeAspect="1"/>
+              </p:cNvPicPr>
+              <p:nvPr/>
+            </p:nvPicPr>
+            <p:blipFill>
+              <a:blip r:embed="rId8">
+                <a:extLst>
+                  <a:ext uri="{28A0092B-C50C-407E-A947-70E740481C1C}">
+                    <a14:useLocalDpi xmlns:a14="http://schemas.microsoft.com/office/drawing/2010/main" val="0"/>
+                  </a:ext>
+                </a:extLst>
+              </a:blip>
+              <a:stretch>
+                <a:fillRect/>
+              </a:stretch>
+            </p:blipFill>
+            <p:spPr>
+              <a:xfrm>
+                <a:off x="323520" y="1471115"/>
+                <a:ext cx="2579437" cy="451156"/>
+              </a:xfrm>
+              <a:prstGeom prst="rect">
+                <a:avLst/>
+              </a:prstGeom>
+            </p:spPr>
+          </p:pic>
+          <p:sp>
+            <p:nvSpPr>
+              <p:cNvPr id="14" name="Rectangle 13"/>
+              <p:cNvSpPr/>
+              <p:nvPr/>
+            </p:nvSpPr>
+            <p:spPr>
+              <a:xfrm>
+                <a:off x="323520" y="1417639"/>
+                <a:ext cx="2497213" cy="504632"/>
+              </a:xfrm>
+              <a:prstGeom prst="rect">
+                <a:avLst/>
+              </a:prstGeom>
+              <a:noFill/>
+              <a:ln>
+                <a:solidFill>
+                  <a:srgbClr val="FF0000"/>
+                </a:solidFill>
+              </a:ln>
+              <a:effectLst/>
+            </p:spPr>
+            <p:style>
+              <a:lnRef idx="1">
+                <a:schemeClr val="accent1"/>
+              </a:lnRef>
+              <a:fillRef idx="3">
+                <a:schemeClr val="accent1"/>
+              </a:fillRef>
+              <a:effectRef idx="2">
+                <a:schemeClr val="accent1"/>
+              </a:effectRef>
+              <a:fontRef idx="minor">
+                <a:schemeClr val="lt1"/>
+              </a:fontRef>
+            </p:style>
+            <p:txBody>
+              <a:bodyPr rtlCol="0" anchor="ctr"/>
+              <a:lstStyle/>
+              <a:p>
+                <a:pPr algn="ctr"/>
+                <a:endParaRPr lang="en-US" dirty="0"/>
+              </a:p>
+            </p:txBody>
+          </p:sp>
+        </p:grpSp>
+      </p:grpSp>
+    </p:spTree>
+    <p:extLst>
+      <p:ext uri="{BB962C8B-B14F-4D97-AF65-F5344CB8AC3E}">
+        <p14:creationId xmlns:p14="http://schemas.microsoft.com/office/powerpoint/2010/main" val="992634817"/>
       </p:ext>
     </p:extLst>
   </p:cSld>

</xml_diff>